<commit_message>
amended fbprophet PS_Method_Machine_Learning _Model.ipynb to include predictions and esg correlation tables and added images for prediction and prediction model
</commit_message>
<xml_diff>
--- a/Dashboard/ESG_Analysis.pptx
+++ b/Dashboard/ESG_Analysis.pptx
@@ -12,6 +12,20 @@
     <p:sldId id="260" r:id="rId10"/>
     <p:sldId id="261" r:id="rId11"/>
     <p:sldId id="262" r:id="rId12"/>
+    <p:sldId id="263" r:id="rId13"/>
+    <p:sldId id="264" r:id="rId14"/>
+    <p:sldId id="265" r:id="rId15"/>
+    <p:sldId id="266" r:id="rId16"/>
+    <p:sldId id="267" r:id="rId17"/>
+    <p:sldId id="268" r:id="rId18"/>
+    <p:sldId id="269" r:id="rId19"/>
+    <p:sldId id="270" r:id="rId20"/>
+    <p:sldId id="271" r:id="rId21"/>
+    <p:sldId id="272" r:id="rId22"/>
+    <p:sldId id="273" r:id="rId23"/>
+    <p:sldId id="274" r:id="rId24"/>
+    <p:sldId id="275" r:id="rId25"/>
+    <p:sldId id="276" r:id="rId26"/>
   </p:sldIdLst>
   <p:sldSz cx="12192000" cy="6858000"/>
   <p:notesSz cx="6858000" cy="9144000"/>
@@ -3332,7 +3346,7 @@
           <p:cNvPr id="0" name="slide1">
             <a:extLst>
               <a:ext uri="{FF2B5EF4-FFF2-40B4-BE49-F238E27FC236}">
-                <a16:creationId xmlns:a16="http://schemas.microsoft.com/office/drawing/2014/main" id="{45A79385-C275-476F-B358-6B215957895A}"/>
+                <a16:creationId xmlns:a16="http://schemas.microsoft.com/office/drawing/2014/main" id="{CB3F5C45-2EA5-4C79-8174-1A619F8A93E3}"/>
               </a:ext>
             </a:extLst>
           </p:cNvPr>
@@ -3360,7 +3374,7 @@
           <p:cNvPr id="1" name="slide1">
             <a:extLst>
               <a:ext uri="{FF2B5EF4-FFF2-40B4-BE49-F238E27FC236}">
-                <a16:creationId xmlns:a16="http://schemas.microsoft.com/office/drawing/2014/main" id="{4D72B8EF-C9F6-4A18-8C1C-FD07F6447C4F}"/>
+                <a16:creationId xmlns:a16="http://schemas.microsoft.com/office/drawing/2014/main" id="{42A5C43D-3ED4-4404-9FB9-399F820B8FF5}"/>
               </a:ext>
             </a:extLst>
           </p:cNvPr>
@@ -3378,11 +3392,671 @@
           <a:p>
             <a:r>
               <a:rPr/>
-              <a:t>File created on: 2022-03-31 3:35:21 PM</a:t>
-            </a:r>
-          </a:p>
-        </p:txBody>
-      </p:sp>
+              <a:t>File created on: 2022-04-08 4:22:38 PM</a:t>
+            </a:r>
+          </a:p>
+        </p:txBody>
+      </p:sp>
+    </p:spTree>
+    <p:extLst>
+      <p:ext uri="{BB962C8B-B14F-4D97-AF65-F5344CB8AC3E}">
+        <p14:creationId xmlns:p14="http://schemas.microsoft.com/office/powerpoint/2010/main" val="95992585"/>
+      </p:ext>
+    </p:extLst>
+  </p:cSld>
+  <p:clrMapOvr>
+    <a:masterClrMapping/>
+  </p:clrMapOvr>
+</p:sld>
+</file>
+
+<file path=ppt/slides/slide10.xml><?xml version="1.0" encoding="utf-8"?>
+<p:sld xmlns:a="http://schemas.openxmlformats.org/drawingml/2006/main" xmlns:p="http://schemas.openxmlformats.org/presentationml/2006/main" xmlns:r="http://schemas.openxmlformats.org/officeDocument/2006/relationships">
+  <p:cSld>
+    <p:spTree>
+      <p:nvGrpSpPr>
+        <p:cNvPr id="1" name=""/>
+        <p:cNvGrpSpPr/>
+        <p:nvPr/>
+      </p:nvGrpSpPr>
+      <p:grpSpPr>
+        <a:xfrm>
+          <a:off x="0" y="0"/>
+          <a:ext cx="0" cy="0"/>
+          <a:chOff x="0" y="0"/>
+          <a:chExt cx="0" cy="0"/>
+        </a:xfrm>
+      </p:grpSpPr>
+      <p:pic>
+        <p:nvPicPr>
+          <p:cNvPr descr="Max ESG Score" id="10" name="slide10">
+            <a:extLst>
+              <a:ext uri="{FF2B5EF4-FFF2-40B4-BE49-F238E27FC236}">
+                <a16:creationId xmlns:a16="http://schemas.microsoft.com/office/drawing/2014/main" id="{6638BF63-B8E3-4A27-A084-D1E322AD3690}"/>
+              </a:ext>
+            </a:extLst>
+          </p:cNvPr>
+          <p:cNvPicPr>
+            <a:picLocks noChangeAspect="1"/>
+          </p:cNvPicPr>
+          <p:nvPr/>
+        </p:nvPicPr>
+        <p:blipFill>
+          <a:blip r:embed="rId15">
+            <a:extLst>
+              <a:ext uri="{28A0092B-C50C-407E-A947-70E740481C1C}">
+                <a14:useLocalDpi xmlns:a14="http://schemas.microsoft.com/office/drawing/2010/main" val="0"/>
+              </a:ext>
+            </a:extLst>
+          </a:blip>
+          <a:stretch>
+            <a:fillRect/>
+          </a:stretch>
+        </p:blipFill>
+        <p:spPr>
+          <a:xfrm>
+            <a:off x="5810250" y="1624012"/>
+            <a:ext cx="571500" cy="3609975"/>
+          </a:xfrm>
+          <a:prstGeom prst="rect">
+            <a:avLst/>
+          </a:prstGeom>
+        </p:spPr>
+      </p:pic>
+    </p:spTree>
+    <p:extLst>
+      <p:ext uri="{BB962C8B-B14F-4D97-AF65-F5344CB8AC3E}">
+        <p14:creationId xmlns:p14="http://schemas.microsoft.com/office/powerpoint/2010/main" val="95992585"/>
+      </p:ext>
+    </p:extLst>
+  </p:cSld>
+  <p:clrMapOvr>
+    <a:masterClrMapping/>
+  </p:clrMapOvr>
+</p:sld>
+</file>
+
+<file path=ppt/slides/slide11.xml><?xml version="1.0" encoding="utf-8"?>
+<p:sld xmlns:a="http://schemas.openxmlformats.org/drawingml/2006/main" xmlns:p="http://schemas.openxmlformats.org/presentationml/2006/main" xmlns:r="http://schemas.openxmlformats.org/officeDocument/2006/relationships">
+  <p:cSld>
+    <p:spTree>
+      <p:nvGrpSpPr>
+        <p:cNvPr id="1" name=""/>
+        <p:cNvGrpSpPr/>
+        <p:nvPr/>
+      </p:nvGrpSpPr>
+      <p:grpSpPr>
+        <a:xfrm>
+          <a:off x="0" y="0"/>
+          <a:ext cx="0" cy="0"/>
+          <a:chOff x="0" y="0"/>
+          <a:chExt cx="0" cy="0"/>
+        </a:xfrm>
+      </p:grpSpPr>
+      <p:pic>
+        <p:nvPicPr>
+          <p:cNvPr descr="Controversies" id="11" name="slide11">
+            <a:extLst>
+              <a:ext uri="{FF2B5EF4-FFF2-40B4-BE49-F238E27FC236}">
+                <a16:creationId xmlns:a16="http://schemas.microsoft.com/office/drawing/2014/main" id="{53AA5171-8171-4E31-AFB1-17149A75D1AB}"/>
+              </a:ext>
+            </a:extLst>
+          </p:cNvPr>
+          <p:cNvPicPr>
+            <a:picLocks noChangeAspect="1"/>
+          </p:cNvPicPr>
+          <p:nvPr/>
+        </p:nvPicPr>
+        <p:blipFill>
+          <a:blip r:embed="rId16">
+            <a:extLst>
+              <a:ext uri="{28A0092B-C50C-407E-A947-70E740481C1C}">
+                <a14:useLocalDpi xmlns:a14="http://schemas.microsoft.com/office/drawing/2010/main" val="0"/>
+              </a:ext>
+            </a:extLst>
+          </a:blip>
+          <a:stretch>
+            <a:fillRect/>
+          </a:stretch>
+        </p:blipFill>
+        <p:spPr>
+          <a:xfrm>
+            <a:off x="1809750" y="0"/>
+            <a:ext cx="8572500" cy="6858000"/>
+          </a:xfrm>
+          <a:prstGeom prst="rect">
+            <a:avLst/>
+          </a:prstGeom>
+        </p:spPr>
+      </p:pic>
+    </p:spTree>
+    <p:extLst>
+      <p:ext uri="{BB962C8B-B14F-4D97-AF65-F5344CB8AC3E}">
+        <p14:creationId xmlns:p14="http://schemas.microsoft.com/office/powerpoint/2010/main" val="95992585"/>
+      </p:ext>
+    </p:extLst>
+  </p:cSld>
+  <p:clrMapOvr>
+    <a:masterClrMapping/>
+  </p:clrMapOvr>
+</p:sld>
+</file>
+
+<file path=ppt/slides/slide12.xml><?xml version="1.0" encoding="utf-8"?>
+<p:sld xmlns:a="http://schemas.openxmlformats.org/drawingml/2006/main" xmlns:p="http://schemas.openxmlformats.org/presentationml/2006/main" xmlns:r="http://schemas.openxmlformats.org/officeDocument/2006/relationships">
+  <p:cSld>
+    <p:spTree>
+      <p:nvGrpSpPr>
+        <p:cNvPr id="1" name=""/>
+        <p:cNvGrpSpPr/>
+        <p:nvPr/>
+      </p:nvGrpSpPr>
+      <p:grpSpPr>
+        <a:xfrm>
+          <a:off x="0" y="0"/>
+          <a:ext cx="0" cy="0"/>
+          <a:chOff x="0" y="0"/>
+          <a:chExt cx="0" cy="0"/>
+        </a:xfrm>
+      </p:grpSpPr>
+      <p:pic>
+        <p:nvPicPr>
+          <p:cNvPr descr="ESG Numbers" id="12" name="slide12">
+            <a:extLst>
+              <a:ext uri="{FF2B5EF4-FFF2-40B4-BE49-F238E27FC236}">
+                <a16:creationId xmlns:a16="http://schemas.microsoft.com/office/drawing/2014/main" id="{59634968-5B4A-469F-A5CA-518A75384F98}"/>
+              </a:ext>
+            </a:extLst>
+          </p:cNvPr>
+          <p:cNvPicPr>
+            <a:picLocks noChangeAspect="1"/>
+          </p:cNvPicPr>
+          <p:nvPr/>
+        </p:nvPicPr>
+        <p:blipFill>
+          <a:blip r:embed="rId17">
+            <a:extLst>
+              <a:ext uri="{28A0092B-C50C-407E-A947-70E740481C1C}">
+                <a14:useLocalDpi xmlns:a14="http://schemas.microsoft.com/office/drawing/2010/main" val="0"/>
+              </a:ext>
+            </a:extLst>
+          </a:blip>
+          <a:stretch>
+            <a:fillRect/>
+          </a:stretch>
+        </p:blipFill>
+        <p:spPr>
+          <a:xfrm>
+            <a:off x="1809750" y="0"/>
+            <a:ext cx="8572500" cy="6858000"/>
+          </a:xfrm>
+          <a:prstGeom prst="rect">
+            <a:avLst/>
+          </a:prstGeom>
+        </p:spPr>
+      </p:pic>
+    </p:spTree>
+    <p:extLst>
+      <p:ext uri="{BB962C8B-B14F-4D97-AF65-F5344CB8AC3E}">
+        <p14:creationId xmlns:p14="http://schemas.microsoft.com/office/powerpoint/2010/main" val="95992585"/>
+      </p:ext>
+    </p:extLst>
+  </p:cSld>
+  <p:clrMapOvr>
+    <a:masterClrMapping/>
+  </p:clrMapOvr>
+</p:sld>
+</file>
+
+<file path=ppt/slides/slide13.xml><?xml version="1.0" encoding="utf-8"?>
+<p:sld xmlns:a="http://schemas.openxmlformats.org/drawingml/2006/main" xmlns:p="http://schemas.openxmlformats.org/presentationml/2006/main" xmlns:r="http://schemas.openxmlformats.org/officeDocument/2006/relationships">
+  <p:cSld>
+    <p:spTree>
+      <p:nvGrpSpPr>
+        <p:cNvPr id="1" name=""/>
+        <p:cNvGrpSpPr/>
+        <p:nvPr/>
+      </p:nvGrpSpPr>
+      <p:grpSpPr>
+        <a:xfrm>
+          <a:off x="0" y="0"/>
+          <a:ext cx="0" cy="0"/>
+          <a:chOff x="0" y="0"/>
+          <a:chExt cx="0" cy="0"/>
+        </a:xfrm>
+      </p:grpSpPr>
+      <p:pic>
+        <p:nvPicPr>
+          <p:cNvPr descr="Stock PredictionDash" id="13" name="slide13">
+            <a:extLst>
+              <a:ext uri="{FF2B5EF4-FFF2-40B4-BE49-F238E27FC236}">
+                <a16:creationId xmlns:a16="http://schemas.microsoft.com/office/drawing/2014/main" id="{8012D986-C162-446F-A05F-E1C1C41D29EA}"/>
+              </a:ext>
+            </a:extLst>
+          </p:cNvPr>
+          <p:cNvPicPr>
+            <a:picLocks noChangeAspect="1"/>
+          </p:cNvPicPr>
+          <p:nvPr/>
+        </p:nvPicPr>
+        <p:blipFill>
+          <a:blip r:embed="rId18">
+            <a:extLst>
+              <a:ext uri="{28A0092B-C50C-407E-A947-70E740481C1C}">
+                <a14:useLocalDpi xmlns:a14="http://schemas.microsoft.com/office/drawing/2010/main" val="0"/>
+              </a:ext>
+            </a:extLst>
+          </a:blip>
+          <a:stretch>
+            <a:fillRect/>
+          </a:stretch>
+        </p:blipFill>
+        <p:spPr>
+          <a:xfrm>
+            <a:off x="1809750" y="0"/>
+            <a:ext cx="8572500" cy="6858000"/>
+          </a:xfrm>
+          <a:prstGeom prst="rect">
+            <a:avLst/>
+          </a:prstGeom>
+        </p:spPr>
+      </p:pic>
+    </p:spTree>
+    <p:extLst>
+      <p:ext uri="{BB962C8B-B14F-4D97-AF65-F5344CB8AC3E}">
+        <p14:creationId xmlns:p14="http://schemas.microsoft.com/office/powerpoint/2010/main" val="95992585"/>
+      </p:ext>
+    </p:extLst>
+  </p:cSld>
+  <p:clrMapOvr>
+    <a:masterClrMapping/>
+  </p:clrMapOvr>
+</p:sld>
+</file>
+
+<file path=ppt/slides/slide14.xml><?xml version="1.0" encoding="utf-8"?>
+<p:sld xmlns:a="http://schemas.openxmlformats.org/drawingml/2006/main" xmlns:p="http://schemas.openxmlformats.org/presentationml/2006/main" xmlns:r="http://schemas.openxmlformats.org/officeDocument/2006/relationships">
+  <p:cSld>
+    <p:spTree>
+      <p:nvGrpSpPr>
+        <p:cNvPr id="1" name=""/>
+        <p:cNvGrpSpPr/>
+        <p:nvPr/>
+      </p:nvGrpSpPr>
+      <p:grpSpPr>
+        <a:xfrm>
+          <a:off x="0" y="0"/>
+          <a:ext cx="0" cy="0"/>
+          <a:chOff x="0" y="0"/>
+          <a:chExt cx="0" cy="0"/>
+        </a:xfrm>
+      </p:grpSpPr>
+      <p:pic>
+        <p:nvPicPr>
+          <p:cNvPr descr="ESG Analysis for predicted stocks1" id="14" name="slide14">
+            <a:extLst>
+              <a:ext uri="{FF2B5EF4-FFF2-40B4-BE49-F238E27FC236}">
+                <a16:creationId xmlns:a16="http://schemas.microsoft.com/office/drawing/2014/main" id="{90AD78E1-875D-4E0B-AC09-EBDE94AB17FF}"/>
+              </a:ext>
+            </a:extLst>
+          </p:cNvPr>
+          <p:cNvPicPr>
+            <a:picLocks noChangeAspect="1"/>
+          </p:cNvPicPr>
+          <p:nvPr/>
+        </p:nvPicPr>
+        <p:blipFill>
+          <a:blip r:embed="rId19">
+            <a:extLst>
+              <a:ext uri="{28A0092B-C50C-407E-A947-70E740481C1C}">
+                <a14:useLocalDpi xmlns:a14="http://schemas.microsoft.com/office/drawing/2010/main" val="0"/>
+              </a:ext>
+            </a:extLst>
+          </a:blip>
+          <a:stretch>
+            <a:fillRect/>
+          </a:stretch>
+        </p:blipFill>
+        <p:spPr>
+          <a:xfrm>
+            <a:off x="1720246" y="0"/>
+            <a:ext cx="8751508" cy="6858000"/>
+          </a:xfrm>
+          <a:prstGeom prst="rect">
+            <a:avLst/>
+          </a:prstGeom>
+        </p:spPr>
+      </p:pic>
+    </p:spTree>
+    <p:extLst>
+      <p:ext uri="{BB962C8B-B14F-4D97-AF65-F5344CB8AC3E}">
+        <p14:creationId xmlns:p14="http://schemas.microsoft.com/office/powerpoint/2010/main" val="95992585"/>
+      </p:ext>
+    </p:extLst>
+  </p:cSld>
+  <p:clrMapOvr>
+    <a:masterClrMapping/>
+  </p:clrMapOvr>
+</p:sld>
+</file>
+
+<file path=ppt/slides/slide15.xml><?xml version="1.0" encoding="utf-8"?>
+<p:sld xmlns:a="http://schemas.openxmlformats.org/drawingml/2006/main" xmlns:p="http://schemas.openxmlformats.org/presentationml/2006/main" xmlns:r="http://schemas.openxmlformats.org/officeDocument/2006/relationships">
+  <p:cSld>
+    <p:spTree>
+      <p:nvGrpSpPr>
+        <p:cNvPr id="1" name=""/>
+        <p:cNvGrpSpPr/>
+        <p:nvPr/>
+      </p:nvGrpSpPr>
+      <p:grpSpPr>
+        <a:xfrm>
+          <a:off x="0" y="0"/>
+          <a:ext cx="0" cy="0"/>
+          <a:chOff x="0" y="0"/>
+          <a:chExt cx="0" cy="0"/>
+        </a:xfrm>
+      </p:grpSpPr>
+      <p:pic>
+        <p:nvPicPr>
+          <p:cNvPr descr="ESG Analysis for predicted stocks5" id="15" name="slide15">
+            <a:extLst>
+              <a:ext uri="{FF2B5EF4-FFF2-40B4-BE49-F238E27FC236}">
+                <a16:creationId xmlns:a16="http://schemas.microsoft.com/office/drawing/2014/main" id="{03130A39-1307-49DE-9A42-208896CA0598}"/>
+              </a:ext>
+            </a:extLst>
+          </p:cNvPr>
+          <p:cNvPicPr>
+            <a:picLocks noChangeAspect="1"/>
+          </p:cNvPicPr>
+          <p:nvPr/>
+        </p:nvPicPr>
+        <p:blipFill>
+          <a:blip r:embed="rId20">
+            <a:extLst>
+              <a:ext uri="{28A0092B-C50C-407E-A947-70E740481C1C}">
+                <a14:useLocalDpi xmlns:a14="http://schemas.microsoft.com/office/drawing/2010/main" val="0"/>
+              </a:ext>
+            </a:extLst>
+          </a:blip>
+          <a:stretch>
+            <a:fillRect/>
+          </a:stretch>
+        </p:blipFill>
+        <p:spPr>
+          <a:xfrm>
+            <a:off x="1720246" y="0"/>
+            <a:ext cx="8751508" cy="6858000"/>
+          </a:xfrm>
+          <a:prstGeom prst="rect">
+            <a:avLst/>
+          </a:prstGeom>
+        </p:spPr>
+      </p:pic>
+    </p:spTree>
+    <p:extLst>
+      <p:ext uri="{BB962C8B-B14F-4D97-AF65-F5344CB8AC3E}">
+        <p14:creationId xmlns:p14="http://schemas.microsoft.com/office/powerpoint/2010/main" val="95992585"/>
+      </p:ext>
+    </p:extLst>
+  </p:cSld>
+  <p:clrMapOvr>
+    <a:masterClrMapping/>
+  </p:clrMapOvr>
+</p:sld>
+</file>
+
+<file path=ppt/slides/slide16.xml><?xml version="1.0" encoding="utf-8"?>
+<p:sld xmlns:a="http://schemas.openxmlformats.org/drawingml/2006/main" xmlns:p="http://schemas.openxmlformats.org/presentationml/2006/main" xmlns:r="http://schemas.openxmlformats.org/officeDocument/2006/relationships">
+  <p:cSld>
+    <p:spTree>
+      <p:nvGrpSpPr>
+        <p:cNvPr id="1" name=""/>
+        <p:cNvGrpSpPr/>
+        <p:nvPr/>
+      </p:nvGrpSpPr>
+      <p:grpSpPr>
+        <a:xfrm>
+          <a:off x="0" y="0"/>
+          <a:ext cx="0" cy="0"/>
+          <a:chOff x="0" y="0"/>
+          <a:chExt cx="0" cy="0"/>
+        </a:xfrm>
+      </p:grpSpPr>
+      <p:pic>
+        <p:nvPicPr>
+          <p:cNvPr descr="ESG Analysis for predicted stocks2" id="16" name="slide16">
+            <a:extLst>
+              <a:ext uri="{FF2B5EF4-FFF2-40B4-BE49-F238E27FC236}">
+                <a16:creationId xmlns:a16="http://schemas.microsoft.com/office/drawing/2014/main" id="{06377B59-6C77-4277-A0F7-ED5F082F0E14}"/>
+              </a:ext>
+            </a:extLst>
+          </p:cNvPr>
+          <p:cNvPicPr>
+            <a:picLocks noChangeAspect="1"/>
+          </p:cNvPicPr>
+          <p:nvPr/>
+        </p:nvPicPr>
+        <p:blipFill>
+          <a:blip r:embed="rId21">
+            <a:extLst>
+              <a:ext uri="{28A0092B-C50C-407E-A947-70E740481C1C}">
+                <a14:useLocalDpi xmlns:a14="http://schemas.microsoft.com/office/drawing/2010/main" val="0"/>
+              </a:ext>
+            </a:extLst>
+          </a:blip>
+          <a:stretch>
+            <a:fillRect/>
+          </a:stretch>
+        </p:blipFill>
+        <p:spPr>
+          <a:xfrm>
+            <a:off x="1720246" y="0"/>
+            <a:ext cx="8751508" cy="6858000"/>
+          </a:xfrm>
+          <a:prstGeom prst="rect">
+            <a:avLst/>
+          </a:prstGeom>
+        </p:spPr>
+      </p:pic>
+    </p:spTree>
+    <p:extLst>
+      <p:ext uri="{BB962C8B-B14F-4D97-AF65-F5344CB8AC3E}">
+        <p14:creationId xmlns:p14="http://schemas.microsoft.com/office/powerpoint/2010/main" val="95992585"/>
+      </p:ext>
+    </p:extLst>
+  </p:cSld>
+  <p:clrMapOvr>
+    <a:masterClrMapping/>
+  </p:clrMapOvr>
+</p:sld>
+</file>
+
+<file path=ppt/slides/slide17.xml><?xml version="1.0" encoding="utf-8"?>
+<p:sld xmlns:a="http://schemas.openxmlformats.org/drawingml/2006/main" xmlns:p="http://schemas.openxmlformats.org/presentationml/2006/main" xmlns:r="http://schemas.openxmlformats.org/officeDocument/2006/relationships">
+  <p:cSld>
+    <p:spTree>
+      <p:nvGrpSpPr>
+        <p:cNvPr id="1" name=""/>
+        <p:cNvGrpSpPr/>
+        <p:nvPr/>
+      </p:nvGrpSpPr>
+      <p:grpSpPr>
+        <a:xfrm>
+          <a:off x="0" y="0"/>
+          <a:ext cx="0" cy="0"/>
+          <a:chOff x="0" y="0"/>
+          <a:chExt cx="0" cy="0"/>
+        </a:xfrm>
+      </p:grpSpPr>
+      <p:pic>
+        <p:nvPicPr>
+          <p:cNvPr descr="ESG Analysis for predicted stocks7" id="17" name="slide17">
+            <a:extLst>
+              <a:ext uri="{FF2B5EF4-FFF2-40B4-BE49-F238E27FC236}">
+                <a16:creationId xmlns:a16="http://schemas.microsoft.com/office/drawing/2014/main" id="{4A44310D-CDAB-4CED-B72D-2E18F5E5ADED}"/>
+              </a:ext>
+            </a:extLst>
+          </p:cNvPr>
+          <p:cNvPicPr>
+            <a:picLocks noChangeAspect="1"/>
+          </p:cNvPicPr>
+          <p:nvPr/>
+        </p:nvPicPr>
+        <p:blipFill>
+          <a:blip r:embed="rId22">
+            <a:extLst>
+              <a:ext uri="{28A0092B-C50C-407E-A947-70E740481C1C}">
+                <a14:useLocalDpi xmlns:a14="http://schemas.microsoft.com/office/drawing/2010/main" val="0"/>
+              </a:ext>
+            </a:extLst>
+          </a:blip>
+          <a:stretch>
+            <a:fillRect/>
+          </a:stretch>
+        </p:blipFill>
+        <p:spPr>
+          <a:xfrm>
+            <a:off x="1720246" y="0"/>
+            <a:ext cx="8751508" cy="6858000"/>
+          </a:xfrm>
+          <a:prstGeom prst="rect">
+            <a:avLst/>
+          </a:prstGeom>
+        </p:spPr>
+      </p:pic>
+    </p:spTree>
+    <p:extLst>
+      <p:ext uri="{BB962C8B-B14F-4D97-AF65-F5344CB8AC3E}">
+        <p14:creationId xmlns:p14="http://schemas.microsoft.com/office/powerpoint/2010/main" val="95992585"/>
+      </p:ext>
+    </p:extLst>
+  </p:cSld>
+  <p:clrMapOvr>
+    <a:masterClrMapping/>
+  </p:clrMapOvr>
+</p:sld>
+</file>
+
+<file path=ppt/slides/slide18.xml><?xml version="1.0" encoding="utf-8"?>
+<p:sld xmlns:a="http://schemas.openxmlformats.org/drawingml/2006/main" xmlns:p="http://schemas.openxmlformats.org/presentationml/2006/main" xmlns:r="http://schemas.openxmlformats.org/officeDocument/2006/relationships">
+  <p:cSld>
+    <p:spTree>
+      <p:nvGrpSpPr>
+        <p:cNvPr id="1" name=""/>
+        <p:cNvGrpSpPr/>
+        <p:nvPr/>
+      </p:nvGrpSpPr>
+      <p:grpSpPr>
+        <a:xfrm>
+          <a:off x="0" y="0"/>
+          <a:ext cx="0" cy="0"/>
+          <a:chOff x="0" y="0"/>
+          <a:chExt cx="0" cy="0"/>
+        </a:xfrm>
+      </p:grpSpPr>
+      <p:pic>
+        <p:nvPicPr>
+          <p:cNvPr descr="ESG Analysis for predicted stocks8" id="18" name="slide18">
+            <a:extLst>
+              <a:ext uri="{FF2B5EF4-FFF2-40B4-BE49-F238E27FC236}">
+                <a16:creationId xmlns:a16="http://schemas.microsoft.com/office/drawing/2014/main" id="{018C3623-42FA-442D-81C2-FDCC13047B54}"/>
+              </a:ext>
+            </a:extLst>
+          </p:cNvPr>
+          <p:cNvPicPr>
+            <a:picLocks noChangeAspect="1"/>
+          </p:cNvPicPr>
+          <p:nvPr/>
+        </p:nvPicPr>
+        <p:blipFill>
+          <a:blip r:embed="rId23">
+            <a:extLst>
+              <a:ext uri="{28A0092B-C50C-407E-A947-70E740481C1C}">
+                <a14:useLocalDpi xmlns:a14="http://schemas.microsoft.com/office/drawing/2010/main" val="0"/>
+              </a:ext>
+            </a:extLst>
+          </a:blip>
+          <a:stretch>
+            <a:fillRect/>
+          </a:stretch>
+        </p:blipFill>
+        <p:spPr>
+          <a:xfrm>
+            <a:off x="1720246" y="0"/>
+            <a:ext cx="8751508" cy="6858000"/>
+          </a:xfrm>
+          <a:prstGeom prst="rect">
+            <a:avLst/>
+          </a:prstGeom>
+        </p:spPr>
+      </p:pic>
+    </p:spTree>
+    <p:extLst>
+      <p:ext uri="{BB962C8B-B14F-4D97-AF65-F5344CB8AC3E}">
+        <p14:creationId xmlns:p14="http://schemas.microsoft.com/office/powerpoint/2010/main" val="95992585"/>
+      </p:ext>
+    </p:extLst>
+  </p:cSld>
+  <p:clrMapOvr>
+    <a:masterClrMapping/>
+  </p:clrMapOvr>
+</p:sld>
+</file>
+
+<file path=ppt/slides/slide19.xml><?xml version="1.0" encoding="utf-8"?>
+<p:sld xmlns:a="http://schemas.openxmlformats.org/drawingml/2006/main" xmlns:p="http://schemas.openxmlformats.org/presentationml/2006/main" xmlns:r="http://schemas.openxmlformats.org/officeDocument/2006/relationships">
+  <p:cSld>
+    <p:spTree>
+      <p:nvGrpSpPr>
+        <p:cNvPr id="1" name=""/>
+        <p:cNvGrpSpPr/>
+        <p:nvPr/>
+      </p:nvGrpSpPr>
+      <p:grpSpPr>
+        <a:xfrm>
+          <a:off x="0" y="0"/>
+          <a:ext cx="0" cy="0"/>
+          <a:chOff x="0" y="0"/>
+          <a:chExt cx="0" cy="0"/>
+        </a:xfrm>
+      </p:grpSpPr>
+      <p:pic>
+        <p:nvPicPr>
+          <p:cNvPr descr="ESG Analysis for predicted stocks9" id="19" name="slide19">
+            <a:extLst>
+              <a:ext uri="{FF2B5EF4-FFF2-40B4-BE49-F238E27FC236}">
+                <a16:creationId xmlns:a16="http://schemas.microsoft.com/office/drawing/2014/main" id="{17E8C02E-5BB4-4D5A-8F24-A996B2BF0B30}"/>
+              </a:ext>
+            </a:extLst>
+          </p:cNvPr>
+          <p:cNvPicPr>
+            <a:picLocks noChangeAspect="1"/>
+          </p:cNvPicPr>
+          <p:nvPr/>
+        </p:nvPicPr>
+        <p:blipFill>
+          <a:blip r:embed="rId24">
+            <a:extLst>
+              <a:ext uri="{28A0092B-C50C-407E-A947-70E740481C1C}">
+                <a14:useLocalDpi xmlns:a14="http://schemas.microsoft.com/office/drawing/2010/main" val="0"/>
+              </a:ext>
+            </a:extLst>
+          </a:blip>
+          <a:stretch>
+            <a:fillRect/>
+          </a:stretch>
+        </p:blipFill>
+        <p:spPr>
+          <a:xfrm>
+            <a:off x="1720246" y="0"/>
+            <a:ext cx="8751508" cy="6858000"/>
+          </a:xfrm>
+          <a:prstGeom prst="rect">
+            <a:avLst/>
+          </a:prstGeom>
+        </p:spPr>
+      </p:pic>
     </p:spTree>
     <p:extLst>
       <p:ext uri="{BB962C8B-B14F-4D97-AF65-F5344CB8AC3E}">
@@ -3415,10 +4089,10 @@
       </p:grpSpPr>
       <p:pic>
         <p:nvPicPr>
-          <p:cNvPr descr="ESG analysis and stock performance1" id="2" name="slide2">
-            <a:extLst>
-              <a:ext uri="{FF2B5EF4-FFF2-40B4-BE49-F238E27FC236}">
-                <a16:creationId xmlns:a16="http://schemas.microsoft.com/office/drawing/2014/main" id="{ED23687E-9799-4BDE-B18F-1869ECCA65FD}"/>
+          <p:cNvPr descr="ESG score of featured companies by industry" id="2" name="slide2">
+            <a:extLst>
+              <a:ext uri="{FF2B5EF4-FFF2-40B4-BE49-F238E27FC236}">
+                <a16:creationId xmlns:a16="http://schemas.microsoft.com/office/drawing/2014/main" id="{AE5AEBB3-E9F4-490A-AC46-BDC9A61693E4}"/>
               </a:ext>
             </a:extLst>
           </p:cNvPr>
@@ -3441,8 +4115,140 @@
         </p:blipFill>
         <p:spPr>
           <a:xfrm>
-            <a:off x="2482033" y="0"/>
-            <a:ext cx="7227934" cy="6858000"/>
+            <a:off x="2774068" y="0"/>
+            <a:ext cx="6643863" cy="6858000"/>
+          </a:xfrm>
+          <a:prstGeom prst="rect">
+            <a:avLst/>
+          </a:prstGeom>
+        </p:spPr>
+      </p:pic>
+    </p:spTree>
+    <p:extLst>
+      <p:ext uri="{BB962C8B-B14F-4D97-AF65-F5344CB8AC3E}">
+        <p14:creationId xmlns:p14="http://schemas.microsoft.com/office/powerpoint/2010/main" val="95992585"/>
+      </p:ext>
+    </p:extLst>
+  </p:cSld>
+  <p:clrMapOvr>
+    <a:masterClrMapping/>
+  </p:clrMapOvr>
+</p:sld>
+</file>
+
+<file path=ppt/slides/slide20.xml><?xml version="1.0" encoding="utf-8"?>
+<p:sld xmlns:a="http://schemas.openxmlformats.org/drawingml/2006/main" xmlns:p="http://schemas.openxmlformats.org/presentationml/2006/main" xmlns:r="http://schemas.openxmlformats.org/officeDocument/2006/relationships">
+  <p:cSld>
+    <p:spTree>
+      <p:nvGrpSpPr>
+        <p:cNvPr id="1" name=""/>
+        <p:cNvGrpSpPr/>
+        <p:nvPr/>
+      </p:nvGrpSpPr>
+      <p:grpSpPr>
+        <a:xfrm>
+          <a:off x="0" y="0"/>
+          <a:ext cx="0" cy="0"/>
+          <a:chOff x="0" y="0"/>
+          <a:chExt cx="0" cy="0"/>
+        </a:xfrm>
+      </p:grpSpPr>
+      <p:pic>
+        <p:nvPicPr>
+          <p:cNvPr descr="ESG correlation analysis" id="20" name="slide20">
+            <a:extLst>
+              <a:ext uri="{FF2B5EF4-FFF2-40B4-BE49-F238E27FC236}">
+                <a16:creationId xmlns:a16="http://schemas.microsoft.com/office/drawing/2014/main" id="{A628EB71-192A-4CDC-A656-623353175EE0}"/>
+              </a:ext>
+            </a:extLst>
+          </p:cNvPr>
+          <p:cNvPicPr>
+            <a:picLocks noChangeAspect="1"/>
+          </p:cNvPicPr>
+          <p:nvPr/>
+        </p:nvPicPr>
+        <p:blipFill>
+          <a:blip r:embed="rId25">
+            <a:extLst>
+              <a:ext uri="{28A0092B-C50C-407E-A947-70E740481C1C}">
+                <a14:useLocalDpi xmlns:a14="http://schemas.microsoft.com/office/drawing/2010/main" val="0"/>
+              </a:ext>
+            </a:extLst>
+          </a:blip>
+          <a:stretch>
+            <a:fillRect/>
+          </a:stretch>
+        </p:blipFill>
+        <p:spPr>
+          <a:xfrm>
+            <a:off x="0" y="23413"/>
+            <a:ext cx="12192000" cy="6811173"/>
+          </a:xfrm>
+          <a:prstGeom prst="rect">
+            <a:avLst/>
+          </a:prstGeom>
+        </p:spPr>
+      </p:pic>
+    </p:spTree>
+    <p:extLst>
+      <p:ext uri="{BB962C8B-B14F-4D97-AF65-F5344CB8AC3E}">
+        <p14:creationId xmlns:p14="http://schemas.microsoft.com/office/powerpoint/2010/main" val="95992585"/>
+      </p:ext>
+    </p:extLst>
+  </p:cSld>
+  <p:clrMapOvr>
+    <a:masterClrMapping/>
+  </p:clrMapOvr>
+</p:sld>
+</file>
+
+<file path=ppt/slides/slide21.xml><?xml version="1.0" encoding="utf-8"?>
+<p:sld xmlns:a="http://schemas.openxmlformats.org/drawingml/2006/main" xmlns:p="http://schemas.openxmlformats.org/presentationml/2006/main" xmlns:r="http://schemas.openxmlformats.org/officeDocument/2006/relationships">
+  <p:cSld>
+    <p:spTree>
+      <p:nvGrpSpPr>
+        <p:cNvPr id="1" name=""/>
+        <p:cNvGrpSpPr/>
+        <p:nvPr/>
+      </p:nvGrpSpPr>
+      <p:grpSpPr>
+        <a:xfrm>
+          <a:off x="0" y="0"/>
+          <a:ext cx="0" cy="0"/>
+          <a:chOff x="0" y="0"/>
+          <a:chExt cx="0" cy="0"/>
+        </a:xfrm>
+      </p:grpSpPr>
+      <p:pic>
+        <p:nvPicPr>
+          <p:cNvPr descr="Max ESG Score (2)" id="21" name="slide21">
+            <a:extLst>
+              <a:ext uri="{FF2B5EF4-FFF2-40B4-BE49-F238E27FC236}">
+                <a16:creationId xmlns:a16="http://schemas.microsoft.com/office/drawing/2014/main" id="{96505234-FFF5-4D6B-877D-8A44F6B0E0BE}"/>
+              </a:ext>
+            </a:extLst>
+          </p:cNvPr>
+          <p:cNvPicPr>
+            <a:picLocks noChangeAspect="1"/>
+          </p:cNvPicPr>
+          <p:nvPr/>
+        </p:nvPicPr>
+        <p:blipFill>
+          <a:blip r:embed="rId26">
+            <a:extLst>
+              <a:ext uri="{28A0092B-C50C-407E-A947-70E740481C1C}">
+                <a14:useLocalDpi xmlns:a14="http://schemas.microsoft.com/office/drawing/2010/main" val="0"/>
+              </a:ext>
+            </a:extLst>
+          </a:blip>
+          <a:stretch>
+            <a:fillRect/>
+          </a:stretch>
+        </p:blipFill>
+        <p:spPr>
+          <a:xfrm>
+            <a:off x="5810250" y="1524000"/>
+            <a:ext cx="571500" cy="3810000"/>
           </a:xfrm>
           <a:prstGeom prst="rect">
             <a:avLst/>
@@ -3481,10 +4287,10 @@
       </p:grpSpPr>
       <p:pic>
         <p:nvPicPr>
-          <p:cNvPr descr="ESG analysis and stock performance2" id="3" name="slide3">
-            <a:extLst>
-              <a:ext uri="{FF2B5EF4-FFF2-40B4-BE49-F238E27FC236}">
-                <a16:creationId xmlns:a16="http://schemas.microsoft.com/office/drawing/2014/main" id="{8C737951-9EE5-4EB2-94D3-58BA7BD2E6C0}"/>
+          <p:cNvPr descr="Breakup of ESG scores based on Industry" id="3" name="slide3">
+            <a:extLst>
+              <a:ext uri="{FF2B5EF4-FFF2-40B4-BE49-F238E27FC236}">
+                <a16:creationId xmlns:a16="http://schemas.microsoft.com/office/drawing/2014/main" id="{76F7BCDC-94D9-4EEA-9F45-5EBDF17CBEE5}"/>
               </a:ext>
             </a:extLst>
           </p:cNvPr>
@@ -3507,8 +4313,8 @@
         </p:blipFill>
         <p:spPr>
           <a:xfrm>
-            <a:off x="2482033" y="0"/>
-            <a:ext cx="7227934" cy="6858000"/>
+            <a:off x="0" y="825819"/>
+            <a:ext cx="12192000" cy="5206361"/>
           </a:xfrm>
           <a:prstGeom prst="rect">
             <a:avLst/>
@@ -3547,10 +4353,10 @@
       </p:grpSpPr>
       <p:pic>
         <p:nvPicPr>
-          <p:cNvPr descr="ESG analysis and stock performance3" id="4" name="slide4">
-            <a:extLst>
-              <a:ext uri="{FF2B5EF4-FFF2-40B4-BE49-F238E27FC236}">
-                <a16:creationId xmlns:a16="http://schemas.microsoft.com/office/drawing/2014/main" id="{4438E1CB-733A-4A1E-A111-80E053A3AC3A}"/>
+          <p:cNvPr descr="All types of controversies across companies" id="4" name="slide4">
+            <a:extLst>
+              <a:ext uri="{FF2B5EF4-FFF2-40B4-BE49-F238E27FC236}">
+                <a16:creationId xmlns:a16="http://schemas.microsoft.com/office/drawing/2014/main" id="{BBC60F45-1BD5-4FDE-84F6-0A70ADA1744A}"/>
               </a:ext>
             </a:extLst>
           </p:cNvPr>
@@ -3573,8 +4379,8 @@
         </p:blipFill>
         <p:spPr>
           <a:xfrm>
-            <a:off x="2482033" y="0"/>
-            <a:ext cx="7227934" cy="6858000"/>
+            <a:off x="3283369" y="0"/>
+            <a:ext cx="5625260" cy="6858000"/>
           </a:xfrm>
           <a:prstGeom prst="rect">
             <a:avLst/>
@@ -3613,10 +4419,10 @@
       </p:grpSpPr>
       <p:pic>
         <p:nvPicPr>
-          <p:cNvPr descr="ESG analysis and stock performance4" id="5" name="slide5">
-            <a:extLst>
-              <a:ext uri="{FF2B5EF4-FFF2-40B4-BE49-F238E27FC236}">
-                <a16:creationId xmlns:a16="http://schemas.microsoft.com/office/drawing/2014/main" id="{22896038-59A2-489F-97D5-6B7658D366D9}"/>
+          <p:cNvPr descr="Controversial business values across companies" id="5" name="slide5">
+            <a:extLst>
+              <a:ext uri="{FF2B5EF4-FFF2-40B4-BE49-F238E27FC236}">
+                <a16:creationId xmlns:a16="http://schemas.microsoft.com/office/drawing/2014/main" id="{CD21171B-7876-40FB-B290-A31D36C64E39}"/>
               </a:ext>
             </a:extLst>
           </p:cNvPr>
@@ -3639,8 +4445,8 @@
         </p:blipFill>
         <p:spPr>
           <a:xfrm>
-            <a:off x="2482033" y="0"/>
-            <a:ext cx="7227934" cy="6858000"/>
+            <a:off x="3965222" y="0"/>
+            <a:ext cx="4261555" cy="6858000"/>
           </a:xfrm>
           <a:prstGeom prst="rect">
             <a:avLst/>
@@ -3679,10 +4485,10 @@
       </p:grpSpPr>
       <p:pic>
         <p:nvPicPr>
-          <p:cNvPr descr="ESG analysis and stock performance5" id="6" name="slide6">
-            <a:extLst>
-              <a:ext uri="{FF2B5EF4-FFF2-40B4-BE49-F238E27FC236}">
-                <a16:creationId xmlns:a16="http://schemas.microsoft.com/office/drawing/2014/main" id="{F73409F5-397D-42B7-8A17-11F69A2D9D69}"/>
+          <p:cNvPr descr="Stock performance of companies over time" id="6" name="slide6">
+            <a:extLst>
+              <a:ext uri="{FF2B5EF4-FFF2-40B4-BE49-F238E27FC236}">
+                <a16:creationId xmlns:a16="http://schemas.microsoft.com/office/drawing/2014/main" id="{4757FF3C-E463-428D-A90C-2E7850762372}"/>
               </a:ext>
             </a:extLst>
           </p:cNvPr>
@@ -3705,8 +4511,8 @@
         </p:blipFill>
         <p:spPr>
           <a:xfrm>
-            <a:off x="2482033" y="0"/>
-            <a:ext cx="7227934" cy="6858000"/>
+            <a:off x="3943350" y="1785937"/>
+            <a:ext cx="4305300" cy="3286125"/>
           </a:xfrm>
           <a:prstGeom prst="rect">
             <a:avLst/>
@@ -3745,10 +4551,10 @@
       </p:grpSpPr>
       <p:pic>
         <p:nvPicPr>
-          <p:cNvPr descr="ESG analysis and stock performance6" id="7" name="slide7">
-            <a:extLst>
-              <a:ext uri="{FF2B5EF4-FFF2-40B4-BE49-F238E27FC236}">
-                <a16:creationId xmlns:a16="http://schemas.microsoft.com/office/drawing/2014/main" id="{549EB29A-B6A4-411E-92D4-DCDAAC4AE4FA}"/>
+          <p:cNvPr descr="Stock Prediction" id="7" name="slide7">
+            <a:extLst>
+              <a:ext uri="{FF2B5EF4-FFF2-40B4-BE49-F238E27FC236}">
+                <a16:creationId xmlns:a16="http://schemas.microsoft.com/office/drawing/2014/main" id="{87403D60-740B-4BB3-9A48-D56371A09D21}"/>
               </a:ext>
             </a:extLst>
           </p:cNvPr>
@@ -3771,8 +4577,140 @@
         </p:blipFill>
         <p:spPr>
           <a:xfrm>
-            <a:off x="2482033" y="0"/>
-            <a:ext cx="7227934" cy="6858000"/>
+            <a:off x="2130411" y="0"/>
+            <a:ext cx="7931176" cy="6858000"/>
+          </a:xfrm>
+          <a:prstGeom prst="rect">
+            <a:avLst/>
+          </a:prstGeom>
+        </p:spPr>
+      </p:pic>
+    </p:spTree>
+    <p:extLst>
+      <p:ext uri="{BB962C8B-B14F-4D97-AF65-F5344CB8AC3E}">
+        <p14:creationId xmlns:p14="http://schemas.microsoft.com/office/powerpoint/2010/main" val="95992585"/>
+      </p:ext>
+    </p:extLst>
+  </p:cSld>
+  <p:clrMapOvr>
+    <a:masterClrMapping/>
+  </p:clrMapOvr>
+</p:sld>
+</file>
+
+<file path=ppt/slides/slide8.xml><?xml version="1.0" encoding="utf-8"?>
+<p:sld xmlns:a="http://schemas.openxmlformats.org/drawingml/2006/main" xmlns:p="http://schemas.openxmlformats.org/presentationml/2006/main" xmlns:r="http://schemas.openxmlformats.org/officeDocument/2006/relationships">
+  <p:cSld>
+    <p:spTree>
+      <p:nvGrpSpPr>
+        <p:cNvPr id="1" name=""/>
+        <p:cNvGrpSpPr/>
+        <p:nvPr/>
+      </p:nvGrpSpPr>
+      <p:grpSpPr>
+        <a:xfrm>
+          <a:off x="0" y="0"/>
+          <a:ext cx="0" cy="0"/>
+          <a:chOff x="0" y="0"/>
+          <a:chExt cx="0" cy="0"/>
+        </a:xfrm>
+      </p:grpSpPr>
+      <p:pic>
+        <p:nvPicPr>
+          <p:cNvPr descr="Average ESG Score" id="8" name="slide8">
+            <a:extLst>
+              <a:ext uri="{FF2B5EF4-FFF2-40B4-BE49-F238E27FC236}">
+                <a16:creationId xmlns:a16="http://schemas.microsoft.com/office/drawing/2014/main" id="{FC2FBD32-ED33-4792-8CCD-43720E2CA4D3}"/>
+              </a:ext>
+            </a:extLst>
+          </p:cNvPr>
+          <p:cNvPicPr>
+            <a:picLocks noChangeAspect="1"/>
+          </p:cNvPicPr>
+          <p:nvPr/>
+        </p:nvPicPr>
+        <p:blipFill>
+          <a:blip r:embed="rId13">
+            <a:extLst>
+              <a:ext uri="{28A0092B-C50C-407E-A947-70E740481C1C}">
+                <a14:useLocalDpi xmlns:a14="http://schemas.microsoft.com/office/drawing/2010/main" val="0"/>
+              </a:ext>
+            </a:extLst>
+          </a:blip>
+          <a:stretch>
+            <a:fillRect/>
+          </a:stretch>
+        </p:blipFill>
+        <p:spPr>
+          <a:xfrm>
+            <a:off x="5810250" y="1519237"/>
+            <a:ext cx="571500" cy="3819525"/>
+          </a:xfrm>
+          <a:prstGeom prst="rect">
+            <a:avLst/>
+          </a:prstGeom>
+        </p:spPr>
+      </p:pic>
+    </p:spTree>
+    <p:extLst>
+      <p:ext uri="{BB962C8B-B14F-4D97-AF65-F5344CB8AC3E}">
+        <p14:creationId xmlns:p14="http://schemas.microsoft.com/office/powerpoint/2010/main" val="95992585"/>
+      </p:ext>
+    </p:extLst>
+  </p:cSld>
+  <p:clrMapOvr>
+    <a:masterClrMapping/>
+  </p:clrMapOvr>
+</p:sld>
+</file>
+
+<file path=ppt/slides/slide9.xml><?xml version="1.0" encoding="utf-8"?>
+<p:sld xmlns:a="http://schemas.openxmlformats.org/drawingml/2006/main" xmlns:p="http://schemas.openxmlformats.org/presentationml/2006/main" xmlns:r="http://schemas.openxmlformats.org/officeDocument/2006/relationships">
+  <p:cSld>
+    <p:spTree>
+      <p:nvGrpSpPr>
+        <p:cNvPr id="1" name=""/>
+        <p:cNvGrpSpPr/>
+        <p:nvPr/>
+      </p:nvGrpSpPr>
+      <p:grpSpPr>
+        <a:xfrm>
+          <a:off x="0" y="0"/>
+          <a:ext cx="0" cy="0"/>
+          <a:chOff x="0" y="0"/>
+          <a:chExt cx="0" cy="0"/>
+        </a:xfrm>
+      </p:grpSpPr>
+      <p:pic>
+        <p:nvPicPr>
+          <p:cNvPr descr="Total Companies" id="9" name="slide9">
+            <a:extLst>
+              <a:ext uri="{FF2B5EF4-FFF2-40B4-BE49-F238E27FC236}">
+                <a16:creationId xmlns:a16="http://schemas.microsoft.com/office/drawing/2014/main" id="{1BA5CFB0-E2A5-41CC-9FD5-23E0F8846693}"/>
+              </a:ext>
+            </a:extLst>
+          </p:cNvPr>
+          <p:cNvPicPr>
+            <a:picLocks noChangeAspect="1"/>
+          </p:cNvPicPr>
+          <p:nvPr/>
+        </p:nvPicPr>
+        <p:blipFill>
+          <a:blip r:embed="rId14">
+            <a:extLst>
+              <a:ext uri="{28A0092B-C50C-407E-A947-70E740481C1C}">
+                <a14:useLocalDpi xmlns:a14="http://schemas.microsoft.com/office/drawing/2010/main" val="0"/>
+              </a:ext>
+            </a:extLst>
+          </a:blip>
+          <a:stretch>
+            <a:fillRect/>
+          </a:stretch>
+        </p:blipFill>
+        <p:spPr>
+          <a:xfrm>
+            <a:off x="5810250" y="1619250"/>
+            <a:ext cx="571500" cy="3619500"/>
           </a:xfrm>
           <a:prstGeom prst="rect">
             <a:avLst/>

</xml_diff>

<commit_message>
modified presentation dashboard to include ml code
</commit_message>
<xml_diff>
--- a/Dashboard/ESG_Analysis.pptx
+++ b/Dashboard/ESG_Analysis.pptx
@@ -12,20 +12,6 @@
     <p:sldId id="260" r:id="rId10"/>
     <p:sldId id="261" r:id="rId11"/>
     <p:sldId id="262" r:id="rId12"/>
-    <p:sldId id="263" r:id="rId13"/>
-    <p:sldId id="264" r:id="rId14"/>
-    <p:sldId id="265" r:id="rId15"/>
-    <p:sldId id="266" r:id="rId16"/>
-    <p:sldId id="267" r:id="rId17"/>
-    <p:sldId id="268" r:id="rId18"/>
-    <p:sldId id="269" r:id="rId19"/>
-    <p:sldId id="270" r:id="rId20"/>
-    <p:sldId id="271" r:id="rId21"/>
-    <p:sldId id="272" r:id="rId22"/>
-    <p:sldId id="273" r:id="rId23"/>
-    <p:sldId id="274" r:id="rId24"/>
-    <p:sldId id="275" r:id="rId25"/>
-    <p:sldId id="276" r:id="rId26"/>
   </p:sldIdLst>
   <p:sldSz cx="12192000" cy="6858000"/>
   <p:notesSz cx="6858000" cy="9144000"/>
@@ -3346,7 +3332,7 @@
           <p:cNvPr id="0" name="slide1">
             <a:extLst>
               <a:ext uri="{FF2B5EF4-FFF2-40B4-BE49-F238E27FC236}">
-                <a16:creationId xmlns:a16="http://schemas.microsoft.com/office/drawing/2014/main" id="{CB3F5C45-2EA5-4C79-8174-1A619F8A93E3}"/>
+                <a16:creationId xmlns:a16="http://schemas.microsoft.com/office/drawing/2014/main" id="{F5BE6DB0-0ABD-4438-A11B-459AF05617F8}"/>
               </a:ext>
             </a:extLst>
           </p:cNvPr>
@@ -3374,7 +3360,7 @@
           <p:cNvPr id="1" name="slide1">
             <a:extLst>
               <a:ext uri="{FF2B5EF4-FFF2-40B4-BE49-F238E27FC236}">
-                <a16:creationId xmlns:a16="http://schemas.microsoft.com/office/drawing/2014/main" id="{42A5C43D-3ED4-4404-9FB9-399F820B8FF5}"/>
+                <a16:creationId xmlns:a16="http://schemas.microsoft.com/office/drawing/2014/main" id="{2EAE47D9-DD48-4852-9669-710008410DC9}"/>
               </a:ext>
             </a:extLst>
           </p:cNvPr>
@@ -3392,671 +3378,11 @@
           <a:p>
             <a:r>
               <a:rPr/>
-              <a:t>File created on: 2022-04-08 4:22:38 PM</a:t>
-            </a:r>
-          </a:p>
-        </p:txBody>
-      </p:sp>
-    </p:spTree>
-    <p:extLst>
-      <p:ext uri="{BB962C8B-B14F-4D97-AF65-F5344CB8AC3E}">
-        <p14:creationId xmlns:p14="http://schemas.microsoft.com/office/powerpoint/2010/main" val="95992585"/>
-      </p:ext>
-    </p:extLst>
-  </p:cSld>
-  <p:clrMapOvr>
-    <a:masterClrMapping/>
-  </p:clrMapOvr>
-</p:sld>
-</file>
-
-<file path=ppt/slides/slide10.xml><?xml version="1.0" encoding="utf-8"?>
-<p:sld xmlns:a="http://schemas.openxmlformats.org/drawingml/2006/main" xmlns:p="http://schemas.openxmlformats.org/presentationml/2006/main" xmlns:r="http://schemas.openxmlformats.org/officeDocument/2006/relationships">
-  <p:cSld>
-    <p:spTree>
-      <p:nvGrpSpPr>
-        <p:cNvPr id="1" name=""/>
-        <p:cNvGrpSpPr/>
-        <p:nvPr/>
-      </p:nvGrpSpPr>
-      <p:grpSpPr>
-        <a:xfrm>
-          <a:off x="0" y="0"/>
-          <a:ext cx="0" cy="0"/>
-          <a:chOff x="0" y="0"/>
-          <a:chExt cx="0" cy="0"/>
-        </a:xfrm>
-      </p:grpSpPr>
-      <p:pic>
-        <p:nvPicPr>
-          <p:cNvPr descr="Max ESG Score" id="10" name="slide10">
-            <a:extLst>
-              <a:ext uri="{FF2B5EF4-FFF2-40B4-BE49-F238E27FC236}">
-                <a16:creationId xmlns:a16="http://schemas.microsoft.com/office/drawing/2014/main" id="{6638BF63-B8E3-4A27-A084-D1E322AD3690}"/>
-              </a:ext>
-            </a:extLst>
-          </p:cNvPr>
-          <p:cNvPicPr>
-            <a:picLocks noChangeAspect="1"/>
-          </p:cNvPicPr>
-          <p:nvPr/>
-        </p:nvPicPr>
-        <p:blipFill>
-          <a:blip r:embed="rId15">
-            <a:extLst>
-              <a:ext uri="{28A0092B-C50C-407E-A947-70E740481C1C}">
-                <a14:useLocalDpi xmlns:a14="http://schemas.microsoft.com/office/drawing/2010/main" val="0"/>
-              </a:ext>
-            </a:extLst>
-          </a:blip>
-          <a:stretch>
-            <a:fillRect/>
-          </a:stretch>
-        </p:blipFill>
-        <p:spPr>
-          <a:xfrm>
-            <a:off x="5810250" y="1624012"/>
-            <a:ext cx="571500" cy="3609975"/>
-          </a:xfrm>
-          <a:prstGeom prst="rect">
-            <a:avLst/>
-          </a:prstGeom>
-        </p:spPr>
-      </p:pic>
-    </p:spTree>
-    <p:extLst>
-      <p:ext uri="{BB962C8B-B14F-4D97-AF65-F5344CB8AC3E}">
-        <p14:creationId xmlns:p14="http://schemas.microsoft.com/office/powerpoint/2010/main" val="95992585"/>
-      </p:ext>
-    </p:extLst>
-  </p:cSld>
-  <p:clrMapOvr>
-    <a:masterClrMapping/>
-  </p:clrMapOvr>
-</p:sld>
-</file>
-
-<file path=ppt/slides/slide11.xml><?xml version="1.0" encoding="utf-8"?>
-<p:sld xmlns:a="http://schemas.openxmlformats.org/drawingml/2006/main" xmlns:p="http://schemas.openxmlformats.org/presentationml/2006/main" xmlns:r="http://schemas.openxmlformats.org/officeDocument/2006/relationships">
-  <p:cSld>
-    <p:spTree>
-      <p:nvGrpSpPr>
-        <p:cNvPr id="1" name=""/>
-        <p:cNvGrpSpPr/>
-        <p:nvPr/>
-      </p:nvGrpSpPr>
-      <p:grpSpPr>
-        <a:xfrm>
-          <a:off x="0" y="0"/>
-          <a:ext cx="0" cy="0"/>
-          <a:chOff x="0" y="0"/>
-          <a:chExt cx="0" cy="0"/>
-        </a:xfrm>
-      </p:grpSpPr>
-      <p:pic>
-        <p:nvPicPr>
-          <p:cNvPr descr="Controversies" id="11" name="slide11">
-            <a:extLst>
-              <a:ext uri="{FF2B5EF4-FFF2-40B4-BE49-F238E27FC236}">
-                <a16:creationId xmlns:a16="http://schemas.microsoft.com/office/drawing/2014/main" id="{53AA5171-8171-4E31-AFB1-17149A75D1AB}"/>
-              </a:ext>
-            </a:extLst>
-          </p:cNvPr>
-          <p:cNvPicPr>
-            <a:picLocks noChangeAspect="1"/>
-          </p:cNvPicPr>
-          <p:nvPr/>
-        </p:nvPicPr>
-        <p:blipFill>
-          <a:blip r:embed="rId16">
-            <a:extLst>
-              <a:ext uri="{28A0092B-C50C-407E-A947-70E740481C1C}">
-                <a14:useLocalDpi xmlns:a14="http://schemas.microsoft.com/office/drawing/2010/main" val="0"/>
-              </a:ext>
-            </a:extLst>
-          </a:blip>
-          <a:stretch>
-            <a:fillRect/>
-          </a:stretch>
-        </p:blipFill>
-        <p:spPr>
-          <a:xfrm>
-            <a:off x="1809750" y="0"/>
-            <a:ext cx="8572500" cy="6858000"/>
-          </a:xfrm>
-          <a:prstGeom prst="rect">
-            <a:avLst/>
-          </a:prstGeom>
-        </p:spPr>
-      </p:pic>
-    </p:spTree>
-    <p:extLst>
-      <p:ext uri="{BB962C8B-B14F-4D97-AF65-F5344CB8AC3E}">
-        <p14:creationId xmlns:p14="http://schemas.microsoft.com/office/powerpoint/2010/main" val="95992585"/>
-      </p:ext>
-    </p:extLst>
-  </p:cSld>
-  <p:clrMapOvr>
-    <a:masterClrMapping/>
-  </p:clrMapOvr>
-</p:sld>
-</file>
-
-<file path=ppt/slides/slide12.xml><?xml version="1.0" encoding="utf-8"?>
-<p:sld xmlns:a="http://schemas.openxmlformats.org/drawingml/2006/main" xmlns:p="http://schemas.openxmlformats.org/presentationml/2006/main" xmlns:r="http://schemas.openxmlformats.org/officeDocument/2006/relationships">
-  <p:cSld>
-    <p:spTree>
-      <p:nvGrpSpPr>
-        <p:cNvPr id="1" name=""/>
-        <p:cNvGrpSpPr/>
-        <p:nvPr/>
-      </p:nvGrpSpPr>
-      <p:grpSpPr>
-        <a:xfrm>
-          <a:off x="0" y="0"/>
-          <a:ext cx="0" cy="0"/>
-          <a:chOff x="0" y="0"/>
-          <a:chExt cx="0" cy="0"/>
-        </a:xfrm>
-      </p:grpSpPr>
-      <p:pic>
-        <p:nvPicPr>
-          <p:cNvPr descr="ESG Numbers" id="12" name="slide12">
-            <a:extLst>
-              <a:ext uri="{FF2B5EF4-FFF2-40B4-BE49-F238E27FC236}">
-                <a16:creationId xmlns:a16="http://schemas.microsoft.com/office/drawing/2014/main" id="{59634968-5B4A-469F-A5CA-518A75384F98}"/>
-              </a:ext>
-            </a:extLst>
-          </p:cNvPr>
-          <p:cNvPicPr>
-            <a:picLocks noChangeAspect="1"/>
-          </p:cNvPicPr>
-          <p:nvPr/>
-        </p:nvPicPr>
-        <p:blipFill>
-          <a:blip r:embed="rId17">
-            <a:extLst>
-              <a:ext uri="{28A0092B-C50C-407E-A947-70E740481C1C}">
-                <a14:useLocalDpi xmlns:a14="http://schemas.microsoft.com/office/drawing/2010/main" val="0"/>
-              </a:ext>
-            </a:extLst>
-          </a:blip>
-          <a:stretch>
-            <a:fillRect/>
-          </a:stretch>
-        </p:blipFill>
-        <p:spPr>
-          <a:xfrm>
-            <a:off x="1809750" y="0"/>
-            <a:ext cx="8572500" cy="6858000"/>
-          </a:xfrm>
-          <a:prstGeom prst="rect">
-            <a:avLst/>
-          </a:prstGeom>
-        </p:spPr>
-      </p:pic>
-    </p:spTree>
-    <p:extLst>
-      <p:ext uri="{BB962C8B-B14F-4D97-AF65-F5344CB8AC3E}">
-        <p14:creationId xmlns:p14="http://schemas.microsoft.com/office/powerpoint/2010/main" val="95992585"/>
-      </p:ext>
-    </p:extLst>
-  </p:cSld>
-  <p:clrMapOvr>
-    <a:masterClrMapping/>
-  </p:clrMapOvr>
-</p:sld>
-</file>
-
-<file path=ppt/slides/slide13.xml><?xml version="1.0" encoding="utf-8"?>
-<p:sld xmlns:a="http://schemas.openxmlformats.org/drawingml/2006/main" xmlns:p="http://schemas.openxmlformats.org/presentationml/2006/main" xmlns:r="http://schemas.openxmlformats.org/officeDocument/2006/relationships">
-  <p:cSld>
-    <p:spTree>
-      <p:nvGrpSpPr>
-        <p:cNvPr id="1" name=""/>
-        <p:cNvGrpSpPr/>
-        <p:nvPr/>
-      </p:nvGrpSpPr>
-      <p:grpSpPr>
-        <a:xfrm>
-          <a:off x="0" y="0"/>
-          <a:ext cx="0" cy="0"/>
-          <a:chOff x="0" y="0"/>
-          <a:chExt cx="0" cy="0"/>
-        </a:xfrm>
-      </p:grpSpPr>
-      <p:pic>
-        <p:nvPicPr>
-          <p:cNvPr descr="Stock PredictionDash" id="13" name="slide13">
-            <a:extLst>
-              <a:ext uri="{FF2B5EF4-FFF2-40B4-BE49-F238E27FC236}">
-                <a16:creationId xmlns:a16="http://schemas.microsoft.com/office/drawing/2014/main" id="{8012D986-C162-446F-A05F-E1C1C41D29EA}"/>
-              </a:ext>
-            </a:extLst>
-          </p:cNvPr>
-          <p:cNvPicPr>
-            <a:picLocks noChangeAspect="1"/>
-          </p:cNvPicPr>
-          <p:nvPr/>
-        </p:nvPicPr>
-        <p:blipFill>
-          <a:blip r:embed="rId18">
-            <a:extLst>
-              <a:ext uri="{28A0092B-C50C-407E-A947-70E740481C1C}">
-                <a14:useLocalDpi xmlns:a14="http://schemas.microsoft.com/office/drawing/2010/main" val="0"/>
-              </a:ext>
-            </a:extLst>
-          </a:blip>
-          <a:stretch>
-            <a:fillRect/>
-          </a:stretch>
-        </p:blipFill>
-        <p:spPr>
-          <a:xfrm>
-            <a:off x="1809750" y="0"/>
-            <a:ext cx="8572500" cy="6858000"/>
-          </a:xfrm>
-          <a:prstGeom prst="rect">
-            <a:avLst/>
-          </a:prstGeom>
-        </p:spPr>
-      </p:pic>
-    </p:spTree>
-    <p:extLst>
-      <p:ext uri="{BB962C8B-B14F-4D97-AF65-F5344CB8AC3E}">
-        <p14:creationId xmlns:p14="http://schemas.microsoft.com/office/powerpoint/2010/main" val="95992585"/>
-      </p:ext>
-    </p:extLst>
-  </p:cSld>
-  <p:clrMapOvr>
-    <a:masterClrMapping/>
-  </p:clrMapOvr>
-</p:sld>
-</file>
-
-<file path=ppt/slides/slide14.xml><?xml version="1.0" encoding="utf-8"?>
-<p:sld xmlns:a="http://schemas.openxmlformats.org/drawingml/2006/main" xmlns:p="http://schemas.openxmlformats.org/presentationml/2006/main" xmlns:r="http://schemas.openxmlformats.org/officeDocument/2006/relationships">
-  <p:cSld>
-    <p:spTree>
-      <p:nvGrpSpPr>
-        <p:cNvPr id="1" name=""/>
-        <p:cNvGrpSpPr/>
-        <p:nvPr/>
-      </p:nvGrpSpPr>
-      <p:grpSpPr>
-        <a:xfrm>
-          <a:off x="0" y="0"/>
-          <a:ext cx="0" cy="0"/>
-          <a:chOff x="0" y="0"/>
-          <a:chExt cx="0" cy="0"/>
-        </a:xfrm>
-      </p:grpSpPr>
-      <p:pic>
-        <p:nvPicPr>
-          <p:cNvPr descr="ESG Analysis for predicted stocks1" id="14" name="slide14">
-            <a:extLst>
-              <a:ext uri="{FF2B5EF4-FFF2-40B4-BE49-F238E27FC236}">
-                <a16:creationId xmlns:a16="http://schemas.microsoft.com/office/drawing/2014/main" id="{90AD78E1-875D-4E0B-AC09-EBDE94AB17FF}"/>
-              </a:ext>
-            </a:extLst>
-          </p:cNvPr>
-          <p:cNvPicPr>
-            <a:picLocks noChangeAspect="1"/>
-          </p:cNvPicPr>
-          <p:nvPr/>
-        </p:nvPicPr>
-        <p:blipFill>
-          <a:blip r:embed="rId19">
-            <a:extLst>
-              <a:ext uri="{28A0092B-C50C-407E-A947-70E740481C1C}">
-                <a14:useLocalDpi xmlns:a14="http://schemas.microsoft.com/office/drawing/2010/main" val="0"/>
-              </a:ext>
-            </a:extLst>
-          </a:blip>
-          <a:stretch>
-            <a:fillRect/>
-          </a:stretch>
-        </p:blipFill>
-        <p:spPr>
-          <a:xfrm>
-            <a:off x="1720246" y="0"/>
-            <a:ext cx="8751508" cy="6858000"/>
-          </a:xfrm>
-          <a:prstGeom prst="rect">
-            <a:avLst/>
-          </a:prstGeom>
-        </p:spPr>
-      </p:pic>
-    </p:spTree>
-    <p:extLst>
-      <p:ext uri="{BB962C8B-B14F-4D97-AF65-F5344CB8AC3E}">
-        <p14:creationId xmlns:p14="http://schemas.microsoft.com/office/powerpoint/2010/main" val="95992585"/>
-      </p:ext>
-    </p:extLst>
-  </p:cSld>
-  <p:clrMapOvr>
-    <a:masterClrMapping/>
-  </p:clrMapOvr>
-</p:sld>
-</file>
-
-<file path=ppt/slides/slide15.xml><?xml version="1.0" encoding="utf-8"?>
-<p:sld xmlns:a="http://schemas.openxmlformats.org/drawingml/2006/main" xmlns:p="http://schemas.openxmlformats.org/presentationml/2006/main" xmlns:r="http://schemas.openxmlformats.org/officeDocument/2006/relationships">
-  <p:cSld>
-    <p:spTree>
-      <p:nvGrpSpPr>
-        <p:cNvPr id="1" name=""/>
-        <p:cNvGrpSpPr/>
-        <p:nvPr/>
-      </p:nvGrpSpPr>
-      <p:grpSpPr>
-        <a:xfrm>
-          <a:off x="0" y="0"/>
-          <a:ext cx="0" cy="0"/>
-          <a:chOff x="0" y="0"/>
-          <a:chExt cx="0" cy="0"/>
-        </a:xfrm>
-      </p:grpSpPr>
-      <p:pic>
-        <p:nvPicPr>
-          <p:cNvPr descr="ESG Analysis for predicted stocks5" id="15" name="slide15">
-            <a:extLst>
-              <a:ext uri="{FF2B5EF4-FFF2-40B4-BE49-F238E27FC236}">
-                <a16:creationId xmlns:a16="http://schemas.microsoft.com/office/drawing/2014/main" id="{03130A39-1307-49DE-9A42-208896CA0598}"/>
-              </a:ext>
-            </a:extLst>
-          </p:cNvPr>
-          <p:cNvPicPr>
-            <a:picLocks noChangeAspect="1"/>
-          </p:cNvPicPr>
-          <p:nvPr/>
-        </p:nvPicPr>
-        <p:blipFill>
-          <a:blip r:embed="rId20">
-            <a:extLst>
-              <a:ext uri="{28A0092B-C50C-407E-A947-70E740481C1C}">
-                <a14:useLocalDpi xmlns:a14="http://schemas.microsoft.com/office/drawing/2010/main" val="0"/>
-              </a:ext>
-            </a:extLst>
-          </a:blip>
-          <a:stretch>
-            <a:fillRect/>
-          </a:stretch>
-        </p:blipFill>
-        <p:spPr>
-          <a:xfrm>
-            <a:off x="1720246" y="0"/>
-            <a:ext cx="8751508" cy="6858000"/>
-          </a:xfrm>
-          <a:prstGeom prst="rect">
-            <a:avLst/>
-          </a:prstGeom>
-        </p:spPr>
-      </p:pic>
-    </p:spTree>
-    <p:extLst>
-      <p:ext uri="{BB962C8B-B14F-4D97-AF65-F5344CB8AC3E}">
-        <p14:creationId xmlns:p14="http://schemas.microsoft.com/office/powerpoint/2010/main" val="95992585"/>
-      </p:ext>
-    </p:extLst>
-  </p:cSld>
-  <p:clrMapOvr>
-    <a:masterClrMapping/>
-  </p:clrMapOvr>
-</p:sld>
-</file>
-
-<file path=ppt/slides/slide16.xml><?xml version="1.0" encoding="utf-8"?>
-<p:sld xmlns:a="http://schemas.openxmlformats.org/drawingml/2006/main" xmlns:p="http://schemas.openxmlformats.org/presentationml/2006/main" xmlns:r="http://schemas.openxmlformats.org/officeDocument/2006/relationships">
-  <p:cSld>
-    <p:spTree>
-      <p:nvGrpSpPr>
-        <p:cNvPr id="1" name=""/>
-        <p:cNvGrpSpPr/>
-        <p:nvPr/>
-      </p:nvGrpSpPr>
-      <p:grpSpPr>
-        <a:xfrm>
-          <a:off x="0" y="0"/>
-          <a:ext cx="0" cy="0"/>
-          <a:chOff x="0" y="0"/>
-          <a:chExt cx="0" cy="0"/>
-        </a:xfrm>
-      </p:grpSpPr>
-      <p:pic>
-        <p:nvPicPr>
-          <p:cNvPr descr="ESG Analysis for predicted stocks2" id="16" name="slide16">
-            <a:extLst>
-              <a:ext uri="{FF2B5EF4-FFF2-40B4-BE49-F238E27FC236}">
-                <a16:creationId xmlns:a16="http://schemas.microsoft.com/office/drawing/2014/main" id="{06377B59-6C77-4277-A0F7-ED5F082F0E14}"/>
-              </a:ext>
-            </a:extLst>
-          </p:cNvPr>
-          <p:cNvPicPr>
-            <a:picLocks noChangeAspect="1"/>
-          </p:cNvPicPr>
-          <p:nvPr/>
-        </p:nvPicPr>
-        <p:blipFill>
-          <a:blip r:embed="rId21">
-            <a:extLst>
-              <a:ext uri="{28A0092B-C50C-407E-A947-70E740481C1C}">
-                <a14:useLocalDpi xmlns:a14="http://schemas.microsoft.com/office/drawing/2010/main" val="0"/>
-              </a:ext>
-            </a:extLst>
-          </a:blip>
-          <a:stretch>
-            <a:fillRect/>
-          </a:stretch>
-        </p:blipFill>
-        <p:spPr>
-          <a:xfrm>
-            <a:off x="1720246" y="0"/>
-            <a:ext cx="8751508" cy="6858000"/>
-          </a:xfrm>
-          <a:prstGeom prst="rect">
-            <a:avLst/>
-          </a:prstGeom>
-        </p:spPr>
-      </p:pic>
-    </p:spTree>
-    <p:extLst>
-      <p:ext uri="{BB962C8B-B14F-4D97-AF65-F5344CB8AC3E}">
-        <p14:creationId xmlns:p14="http://schemas.microsoft.com/office/powerpoint/2010/main" val="95992585"/>
-      </p:ext>
-    </p:extLst>
-  </p:cSld>
-  <p:clrMapOvr>
-    <a:masterClrMapping/>
-  </p:clrMapOvr>
-</p:sld>
-</file>
-
-<file path=ppt/slides/slide17.xml><?xml version="1.0" encoding="utf-8"?>
-<p:sld xmlns:a="http://schemas.openxmlformats.org/drawingml/2006/main" xmlns:p="http://schemas.openxmlformats.org/presentationml/2006/main" xmlns:r="http://schemas.openxmlformats.org/officeDocument/2006/relationships">
-  <p:cSld>
-    <p:spTree>
-      <p:nvGrpSpPr>
-        <p:cNvPr id="1" name=""/>
-        <p:cNvGrpSpPr/>
-        <p:nvPr/>
-      </p:nvGrpSpPr>
-      <p:grpSpPr>
-        <a:xfrm>
-          <a:off x="0" y="0"/>
-          <a:ext cx="0" cy="0"/>
-          <a:chOff x="0" y="0"/>
-          <a:chExt cx="0" cy="0"/>
-        </a:xfrm>
-      </p:grpSpPr>
-      <p:pic>
-        <p:nvPicPr>
-          <p:cNvPr descr="ESG Analysis for predicted stocks7" id="17" name="slide17">
-            <a:extLst>
-              <a:ext uri="{FF2B5EF4-FFF2-40B4-BE49-F238E27FC236}">
-                <a16:creationId xmlns:a16="http://schemas.microsoft.com/office/drawing/2014/main" id="{4A44310D-CDAB-4CED-B72D-2E18F5E5ADED}"/>
-              </a:ext>
-            </a:extLst>
-          </p:cNvPr>
-          <p:cNvPicPr>
-            <a:picLocks noChangeAspect="1"/>
-          </p:cNvPicPr>
-          <p:nvPr/>
-        </p:nvPicPr>
-        <p:blipFill>
-          <a:blip r:embed="rId22">
-            <a:extLst>
-              <a:ext uri="{28A0092B-C50C-407E-A947-70E740481C1C}">
-                <a14:useLocalDpi xmlns:a14="http://schemas.microsoft.com/office/drawing/2010/main" val="0"/>
-              </a:ext>
-            </a:extLst>
-          </a:blip>
-          <a:stretch>
-            <a:fillRect/>
-          </a:stretch>
-        </p:blipFill>
-        <p:spPr>
-          <a:xfrm>
-            <a:off x="1720246" y="0"/>
-            <a:ext cx="8751508" cy="6858000"/>
-          </a:xfrm>
-          <a:prstGeom prst="rect">
-            <a:avLst/>
-          </a:prstGeom>
-        </p:spPr>
-      </p:pic>
-    </p:spTree>
-    <p:extLst>
-      <p:ext uri="{BB962C8B-B14F-4D97-AF65-F5344CB8AC3E}">
-        <p14:creationId xmlns:p14="http://schemas.microsoft.com/office/powerpoint/2010/main" val="95992585"/>
-      </p:ext>
-    </p:extLst>
-  </p:cSld>
-  <p:clrMapOvr>
-    <a:masterClrMapping/>
-  </p:clrMapOvr>
-</p:sld>
-</file>
-
-<file path=ppt/slides/slide18.xml><?xml version="1.0" encoding="utf-8"?>
-<p:sld xmlns:a="http://schemas.openxmlformats.org/drawingml/2006/main" xmlns:p="http://schemas.openxmlformats.org/presentationml/2006/main" xmlns:r="http://schemas.openxmlformats.org/officeDocument/2006/relationships">
-  <p:cSld>
-    <p:spTree>
-      <p:nvGrpSpPr>
-        <p:cNvPr id="1" name=""/>
-        <p:cNvGrpSpPr/>
-        <p:nvPr/>
-      </p:nvGrpSpPr>
-      <p:grpSpPr>
-        <a:xfrm>
-          <a:off x="0" y="0"/>
-          <a:ext cx="0" cy="0"/>
-          <a:chOff x="0" y="0"/>
-          <a:chExt cx="0" cy="0"/>
-        </a:xfrm>
-      </p:grpSpPr>
-      <p:pic>
-        <p:nvPicPr>
-          <p:cNvPr descr="ESG Analysis for predicted stocks8" id="18" name="slide18">
-            <a:extLst>
-              <a:ext uri="{FF2B5EF4-FFF2-40B4-BE49-F238E27FC236}">
-                <a16:creationId xmlns:a16="http://schemas.microsoft.com/office/drawing/2014/main" id="{018C3623-42FA-442D-81C2-FDCC13047B54}"/>
-              </a:ext>
-            </a:extLst>
-          </p:cNvPr>
-          <p:cNvPicPr>
-            <a:picLocks noChangeAspect="1"/>
-          </p:cNvPicPr>
-          <p:nvPr/>
-        </p:nvPicPr>
-        <p:blipFill>
-          <a:blip r:embed="rId23">
-            <a:extLst>
-              <a:ext uri="{28A0092B-C50C-407E-A947-70E740481C1C}">
-                <a14:useLocalDpi xmlns:a14="http://schemas.microsoft.com/office/drawing/2010/main" val="0"/>
-              </a:ext>
-            </a:extLst>
-          </a:blip>
-          <a:stretch>
-            <a:fillRect/>
-          </a:stretch>
-        </p:blipFill>
-        <p:spPr>
-          <a:xfrm>
-            <a:off x="1720246" y="0"/>
-            <a:ext cx="8751508" cy="6858000"/>
-          </a:xfrm>
-          <a:prstGeom prst="rect">
-            <a:avLst/>
-          </a:prstGeom>
-        </p:spPr>
-      </p:pic>
-    </p:spTree>
-    <p:extLst>
-      <p:ext uri="{BB962C8B-B14F-4D97-AF65-F5344CB8AC3E}">
-        <p14:creationId xmlns:p14="http://schemas.microsoft.com/office/powerpoint/2010/main" val="95992585"/>
-      </p:ext>
-    </p:extLst>
-  </p:cSld>
-  <p:clrMapOvr>
-    <a:masterClrMapping/>
-  </p:clrMapOvr>
-</p:sld>
-</file>
-
-<file path=ppt/slides/slide19.xml><?xml version="1.0" encoding="utf-8"?>
-<p:sld xmlns:a="http://schemas.openxmlformats.org/drawingml/2006/main" xmlns:p="http://schemas.openxmlformats.org/presentationml/2006/main" xmlns:r="http://schemas.openxmlformats.org/officeDocument/2006/relationships">
-  <p:cSld>
-    <p:spTree>
-      <p:nvGrpSpPr>
-        <p:cNvPr id="1" name=""/>
-        <p:cNvGrpSpPr/>
-        <p:nvPr/>
-      </p:nvGrpSpPr>
-      <p:grpSpPr>
-        <a:xfrm>
-          <a:off x="0" y="0"/>
-          <a:ext cx="0" cy="0"/>
-          <a:chOff x="0" y="0"/>
-          <a:chExt cx="0" cy="0"/>
-        </a:xfrm>
-      </p:grpSpPr>
-      <p:pic>
-        <p:nvPicPr>
-          <p:cNvPr descr="ESG Analysis for predicted stocks9" id="19" name="slide19">
-            <a:extLst>
-              <a:ext uri="{FF2B5EF4-FFF2-40B4-BE49-F238E27FC236}">
-                <a16:creationId xmlns:a16="http://schemas.microsoft.com/office/drawing/2014/main" id="{17E8C02E-5BB4-4D5A-8F24-A996B2BF0B30}"/>
-              </a:ext>
-            </a:extLst>
-          </p:cNvPr>
-          <p:cNvPicPr>
-            <a:picLocks noChangeAspect="1"/>
-          </p:cNvPicPr>
-          <p:nvPr/>
-        </p:nvPicPr>
-        <p:blipFill>
-          <a:blip r:embed="rId24">
-            <a:extLst>
-              <a:ext uri="{28A0092B-C50C-407E-A947-70E740481C1C}">
-                <a14:useLocalDpi xmlns:a14="http://schemas.microsoft.com/office/drawing/2010/main" val="0"/>
-              </a:ext>
-            </a:extLst>
-          </a:blip>
-          <a:stretch>
-            <a:fillRect/>
-          </a:stretch>
-        </p:blipFill>
-        <p:spPr>
-          <a:xfrm>
-            <a:off x="1720246" y="0"/>
-            <a:ext cx="8751508" cy="6858000"/>
-          </a:xfrm>
-          <a:prstGeom prst="rect">
-            <a:avLst/>
-          </a:prstGeom>
-        </p:spPr>
-      </p:pic>
+              <a:t>File created on: 2022-04-08 9:15:07 PM</a:t>
+            </a:r>
+          </a:p>
+        </p:txBody>
+      </p:sp>
     </p:spTree>
     <p:extLst>
       <p:ext uri="{BB962C8B-B14F-4D97-AF65-F5344CB8AC3E}">
@@ -4089,10 +3415,10 @@
       </p:grpSpPr>
       <p:pic>
         <p:nvPicPr>
-          <p:cNvPr descr="ESG score of featured companies by industry" id="2" name="slide2">
-            <a:extLst>
-              <a:ext uri="{FF2B5EF4-FFF2-40B4-BE49-F238E27FC236}">
-                <a16:creationId xmlns:a16="http://schemas.microsoft.com/office/drawing/2014/main" id="{AE5AEBB3-E9F4-490A-AC46-BDC9A61693E4}"/>
+          <p:cNvPr descr="ESG Analysis for predicted stocks1" id="2" name="slide2">
+            <a:extLst>
+              <a:ext uri="{FF2B5EF4-FFF2-40B4-BE49-F238E27FC236}">
+                <a16:creationId xmlns:a16="http://schemas.microsoft.com/office/drawing/2014/main" id="{F7C8C7EA-F0BF-42F1-9015-3B0DB005BFE9}"/>
               </a:ext>
             </a:extLst>
           </p:cNvPr>
@@ -4115,140 +3441,8 @@
         </p:blipFill>
         <p:spPr>
           <a:xfrm>
-            <a:off x="2774068" y="0"/>
-            <a:ext cx="6643863" cy="6858000"/>
-          </a:xfrm>
-          <a:prstGeom prst="rect">
-            <a:avLst/>
-          </a:prstGeom>
-        </p:spPr>
-      </p:pic>
-    </p:spTree>
-    <p:extLst>
-      <p:ext uri="{BB962C8B-B14F-4D97-AF65-F5344CB8AC3E}">
-        <p14:creationId xmlns:p14="http://schemas.microsoft.com/office/powerpoint/2010/main" val="95992585"/>
-      </p:ext>
-    </p:extLst>
-  </p:cSld>
-  <p:clrMapOvr>
-    <a:masterClrMapping/>
-  </p:clrMapOvr>
-</p:sld>
-</file>
-
-<file path=ppt/slides/slide20.xml><?xml version="1.0" encoding="utf-8"?>
-<p:sld xmlns:a="http://schemas.openxmlformats.org/drawingml/2006/main" xmlns:p="http://schemas.openxmlformats.org/presentationml/2006/main" xmlns:r="http://schemas.openxmlformats.org/officeDocument/2006/relationships">
-  <p:cSld>
-    <p:spTree>
-      <p:nvGrpSpPr>
-        <p:cNvPr id="1" name=""/>
-        <p:cNvGrpSpPr/>
-        <p:nvPr/>
-      </p:nvGrpSpPr>
-      <p:grpSpPr>
-        <a:xfrm>
-          <a:off x="0" y="0"/>
-          <a:ext cx="0" cy="0"/>
-          <a:chOff x="0" y="0"/>
-          <a:chExt cx="0" cy="0"/>
-        </a:xfrm>
-      </p:grpSpPr>
-      <p:pic>
-        <p:nvPicPr>
-          <p:cNvPr descr="ESG correlation analysis" id="20" name="slide20">
-            <a:extLst>
-              <a:ext uri="{FF2B5EF4-FFF2-40B4-BE49-F238E27FC236}">
-                <a16:creationId xmlns:a16="http://schemas.microsoft.com/office/drawing/2014/main" id="{A628EB71-192A-4CDC-A656-623353175EE0}"/>
-              </a:ext>
-            </a:extLst>
-          </p:cNvPr>
-          <p:cNvPicPr>
-            <a:picLocks noChangeAspect="1"/>
-          </p:cNvPicPr>
-          <p:nvPr/>
-        </p:nvPicPr>
-        <p:blipFill>
-          <a:blip r:embed="rId25">
-            <a:extLst>
-              <a:ext uri="{28A0092B-C50C-407E-A947-70E740481C1C}">
-                <a14:useLocalDpi xmlns:a14="http://schemas.microsoft.com/office/drawing/2010/main" val="0"/>
-              </a:ext>
-            </a:extLst>
-          </a:blip>
-          <a:stretch>
-            <a:fillRect/>
-          </a:stretch>
-        </p:blipFill>
-        <p:spPr>
-          <a:xfrm>
-            <a:off x="0" y="23413"/>
-            <a:ext cx="12192000" cy="6811173"/>
-          </a:xfrm>
-          <a:prstGeom prst="rect">
-            <a:avLst/>
-          </a:prstGeom>
-        </p:spPr>
-      </p:pic>
-    </p:spTree>
-    <p:extLst>
-      <p:ext uri="{BB962C8B-B14F-4D97-AF65-F5344CB8AC3E}">
-        <p14:creationId xmlns:p14="http://schemas.microsoft.com/office/powerpoint/2010/main" val="95992585"/>
-      </p:ext>
-    </p:extLst>
-  </p:cSld>
-  <p:clrMapOvr>
-    <a:masterClrMapping/>
-  </p:clrMapOvr>
-</p:sld>
-</file>
-
-<file path=ppt/slides/slide21.xml><?xml version="1.0" encoding="utf-8"?>
-<p:sld xmlns:a="http://schemas.openxmlformats.org/drawingml/2006/main" xmlns:p="http://schemas.openxmlformats.org/presentationml/2006/main" xmlns:r="http://schemas.openxmlformats.org/officeDocument/2006/relationships">
-  <p:cSld>
-    <p:spTree>
-      <p:nvGrpSpPr>
-        <p:cNvPr id="1" name=""/>
-        <p:cNvGrpSpPr/>
-        <p:nvPr/>
-      </p:nvGrpSpPr>
-      <p:grpSpPr>
-        <a:xfrm>
-          <a:off x="0" y="0"/>
-          <a:ext cx="0" cy="0"/>
-          <a:chOff x="0" y="0"/>
-          <a:chExt cx="0" cy="0"/>
-        </a:xfrm>
-      </p:grpSpPr>
-      <p:pic>
-        <p:nvPicPr>
-          <p:cNvPr descr="Max ESG Score (2)" id="21" name="slide21">
-            <a:extLst>
-              <a:ext uri="{FF2B5EF4-FFF2-40B4-BE49-F238E27FC236}">
-                <a16:creationId xmlns:a16="http://schemas.microsoft.com/office/drawing/2014/main" id="{96505234-FFF5-4D6B-877D-8A44F6B0E0BE}"/>
-              </a:ext>
-            </a:extLst>
-          </p:cNvPr>
-          <p:cNvPicPr>
-            <a:picLocks noChangeAspect="1"/>
-          </p:cNvPicPr>
-          <p:nvPr/>
-        </p:nvPicPr>
-        <p:blipFill>
-          <a:blip r:embed="rId26">
-            <a:extLst>
-              <a:ext uri="{28A0092B-C50C-407E-A947-70E740481C1C}">
-                <a14:useLocalDpi xmlns:a14="http://schemas.microsoft.com/office/drawing/2010/main" val="0"/>
-              </a:ext>
-            </a:extLst>
-          </a:blip>
-          <a:stretch>
-            <a:fillRect/>
-          </a:stretch>
-        </p:blipFill>
-        <p:spPr>
-          <a:xfrm>
-            <a:off x="5810250" y="1524000"/>
-            <a:ext cx="571500" cy="3810000"/>
+            <a:off x="2118041" y="0"/>
+            <a:ext cx="7955916" cy="6858000"/>
           </a:xfrm>
           <a:prstGeom prst="rect">
             <a:avLst/>
@@ -4287,10 +3481,10 @@
       </p:grpSpPr>
       <p:pic>
         <p:nvPicPr>
-          <p:cNvPr descr="Breakup of ESG scores based on Industry" id="3" name="slide3">
-            <a:extLst>
-              <a:ext uri="{FF2B5EF4-FFF2-40B4-BE49-F238E27FC236}">
-                <a16:creationId xmlns:a16="http://schemas.microsoft.com/office/drawing/2014/main" id="{76F7BCDC-94D9-4EEA-9F45-5EBDF17CBEE5}"/>
+          <p:cNvPr descr="ESG Analysis for predicted stocks5" id="3" name="slide3">
+            <a:extLst>
+              <a:ext uri="{FF2B5EF4-FFF2-40B4-BE49-F238E27FC236}">
+                <a16:creationId xmlns:a16="http://schemas.microsoft.com/office/drawing/2014/main" id="{F25D74A2-16A4-443A-BA07-756662D31717}"/>
               </a:ext>
             </a:extLst>
           </p:cNvPr>
@@ -4313,8 +3507,8 @@
         </p:blipFill>
         <p:spPr>
           <a:xfrm>
-            <a:off x="0" y="825819"/>
-            <a:ext cx="12192000" cy="5206361"/>
+            <a:off x="2118041" y="0"/>
+            <a:ext cx="7955916" cy="6858000"/>
           </a:xfrm>
           <a:prstGeom prst="rect">
             <a:avLst/>
@@ -4353,10 +3547,10 @@
       </p:grpSpPr>
       <p:pic>
         <p:nvPicPr>
-          <p:cNvPr descr="All types of controversies across companies" id="4" name="slide4">
-            <a:extLst>
-              <a:ext uri="{FF2B5EF4-FFF2-40B4-BE49-F238E27FC236}">
-                <a16:creationId xmlns:a16="http://schemas.microsoft.com/office/drawing/2014/main" id="{BBC60F45-1BD5-4FDE-84F6-0A70ADA1744A}"/>
+          <p:cNvPr descr="ESG Analysis for predicted stocks2" id="4" name="slide4">
+            <a:extLst>
+              <a:ext uri="{FF2B5EF4-FFF2-40B4-BE49-F238E27FC236}">
+                <a16:creationId xmlns:a16="http://schemas.microsoft.com/office/drawing/2014/main" id="{2D49581E-6D1B-4118-B30C-D1393650ECA6}"/>
               </a:ext>
             </a:extLst>
           </p:cNvPr>
@@ -4379,8 +3573,8 @@
         </p:blipFill>
         <p:spPr>
           <a:xfrm>
-            <a:off x="3283369" y="0"/>
-            <a:ext cx="5625260" cy="6858000"/>
+            <a:off x="2118041" y="0"/>
+            <a:ext cx="7955916" cy="6858000"/>
           </a:xfrm>
           <a:prstGeom prst="rect">
             <a:avLst/>
@@ -4419,10 +3613,10 @@
       </p:grpSpPr>
       <p:pic>
         <p:nvPicPr>
-          <p:cNvPr descr="Controversial business values across companies" id="5" name="slide5">
-            <a:extLst>
-              <a:ext uri="{FF2B5EF4-FFF2-40B4-BE49-F238E27FC236}">
-                <a16:creationId xmlns:a16="http://schemas.microsoft.com/office/drawing/2014/main" id="{CD21171B-7876-40FB-B290-A31D36C64E39}"/>
+          <p:cNvPr descr="ESG Analysis for predicted stocks7" id="5" name="slide5">
+            <a:extLst>
+              <a:ext uri="{FF2B5EF4-FFF2-40B4-BE49-F238E27FC236}">
+                <a16:creationId xmlns:a16="http://schemas.microsoft.com/office/drawing/2014/main" id="{CF421625-3A3B-44DA-BE80-A859EEDA6152}"/>
               </a:ext>
             </a:extLst>
           </p:cNvPr>
@@ -4445,8 +3639,8 @@
         </p:blipFill>
         <p:spPr>
           <a:xfrm>
-            <a:off x="3965222" y="0"/>
-            <a:ext cx="4261555" cy="6858000"/>
+            <a:off x="2118041" y="0"/>
+            <a:ext cx="7955916" cy="6858000"/>
           </a:xfrm>
           <a:prstGeom prst="rect">
             <a:avLst/>
@@ -4485,10 +3679,10 @@
       </p:grpSpPr>
       <p:pic>
         <p:nvPicPr>
-          <p:cNvPr descr="Stock performance of companies over time" id="6" name="slide6">
-            <a:extLst>
-              <a:ext uri="{FF2B5EF4-FFF2-40B4-BE49-F238E27FC236}">
-                <a16:creationId xmlns:a16="http://schemas.microsoft.com/office/drawing/2014/main" id="{4757FF3C-E463-428D-A90C-2E7850762372}"/>
+          <p:cNvPr descr="ESG Analysis for predicted stocks8" id="6" name="slide6">
+            <a:extLst>
+              <a:ext uri="{FF2B5EF4-FFF2-40B4-BE49-F238E27FC236}">
+                <a16:creationId xmlns:a16="http://schemas.microsoft.com/office/drawing/2014/main" id="{67FA76A2-50D2-4781-95D6-76862F142147}"/>
               </a:ext>
             </a:extLst>
           </p:cNvPr>
@@ -4511,8 +3705,8 @@
         </p:blipFill>
         <p:spPr>
           <a:xfrm>
-            <a:off x="3943350" y="1785937"/>
-            <a:ext cx="4305300" cy="3286125"/>
+            <a:off x="2118041" y="0"/>
+            <a:ext cx="7955916" cy="6858000"/>
           </a:xfrm>
           <a:prstGeom prst="rect">
             <a:avLst/>
@@ -4551,10 +3745,10 @@
       </p:grpSpPr>
       <p:pic>
         <p:nvPicPr>
-          <p:cNvPr descr="Stock Prediction" id="7" name="slide7">
-            <a:extLst>
-              <a:ext uri="{FF2B5EF4-FFF2-40B4-BE49-F238E27FC236}">
-                <a16:creationId xmlns:a16="http://schemas.microsoft.com/office/drawing/2014/main" id="{87403D60-740B-4BB3-9A48-D56371A09D21}"/>
+          <p:cNvPr descr="ESG Analysis for predicted stocks9" id="7" name="slide7">
+            <a:extLst>
+              <a:ext uri="{FF2B5EF4-FFF2-40B4-BE49-F238E27FC236}">
+                <a16:creationId xmlns:a16="http://schemas.microsoft.com/office/drawing/2014/main" id="{2EC235D1-9117-48FE-9386-0F75D718AAD5}"/>
               </a:ext>
             </a:extLst>
           </p:cNvPr>
@@ -4577,140 +3771,8 @@
         </p:blipFill>
         <p:spPr>
           <a:xfrm>
-            <a:off x="2130411" y="0"/>
-            <a:ext cx="7931176" cy="6858000"/>
-          </a:xfrm>
-          <a:prstGeom prst="rect">
-            <a:avLst/>
-          </a:prstGeom>
-        </p:spPr>
-      </p:pic>
-    </p:spTree>
-    <p:extLst>
-      <p:ext uri="{BB962C8B-B14F-4D97-AF65-F5344CB8AC3E}">
-        <p14:creationId xmlns:p14="http://schemas.microsoft.com/office/powerpoint/2010/main" val="95992585"/>
-      </p:ext>
-    </p:extLst>
-  </p:cSld>
-  <p:clrMapOvr>
-    <a:masterClrMapping/>
-  </p:clrMapOvr>
-</p:sld>
-</file>
-
-<file path=ppt/slides/slide8.xml><?xml version="1.0" encoding="utf-8"?>
-<p:sld xmlns:a="http://schemas.openxmlformats.org/drawingml/2006/main" xmlns:p="http://schemas.openxmlformats.org/presentationml/2006/main" xmlns:r="http://schemas.openxmlformats.org/officeDocument/2006/relationships">
-  <p:cSld>
-    <p:spTree>
-      <p:nvGrpSpPr>
-        <p:cNvPr id="1" name=""/>
-        <p:cNvGrpSpPr/>
-        <p:nvPr/>
-      </p:nvGrpSpPr>
-      <p:grpSpPr>
-        <a:xfrm>
-          <a:off x="0" y="0"/>
-          <a:ext cx="0" cy="0"/>
-          <a:chOff x="0" y="0"/>
-          <a:chExt cx="0" cy="0"/>
-        </a:xfrm>
-      </p:grpSpPr>
-      <p:pic>
-        <p:nvPicPr>
-          <p:cNvPr descr="Average ESG Score" id="8" name="slide8">
-            <a:extLst>
-              <a:ext uri="{FF2B5EF4-FFF2-40B4-BE49-F238E27FC236}">
-                <a16:creationId xmlns:a16="http://schemas.microsoft.com/office/drawing/2014/main" id="{FC2FBD32-ED33-4792-8CCD-43720E2CA4D3}"/>
-              </a:ext>
-            </a:extLst>
-          </p:cNvPr>
-          <p:cNvPicPr>
-            <a:picLocks noChangeAspect="1"/>
-          </p:cNvPicPr>
-          <p:nvPr/>
-        </p:nvPicPr>
-        <p:blipFill>
-          <a:blip r:embed="rId13">
-            <a:extLst>
-              <a:ext uri="{28A0092B-C50C-407E-A947-70E740481C1C}">
-                <a14:useLocalDpi xmlns:a14="http://schemas.microsoft.com/office/drawing/2010/main" val="0"/>
-              </a:ext>
-            </a:extLst>
-          </a:blip>
-          <a:stretch>
-            <a:fillRect/>
-          </a:stretch>
-        </p:blipFill>
-        <p:spPr>
-          <a:xfrm>
-            <a:off x="5810250" y="1519237"/>
-            <a:ext cx="571500" cy="3819525"/>
-          </a:xfrm>
-          <a:prstGeom prst="rect">
-            <a:avLst/>
-          </a:prstGeom>
-        </p:spPr>
-      </p:pic>
-    </p:spTree>
-    <p:extLst>
-      <p:ext uri="{BB962C8B-B14F-4D97-AF65-F5344CB8AC3E}">
-        <p14:creationId xmlns:p14="http://schemas.microsoft.com/office/powerpoint/2010/main" val="95992585"/>
-      </p:ext>
-    </p:extLst>
-  </p:cSld>
-  <p:clrMapOvr>
-    <a:masterClrMapping/>
-  </p:clrMapOvr>
-</p:sld>
-</file>
-
-<file path=ppt/slides/slide9.xml><?xml version="1.0" encoding="utf-8"?>
-<p:sld xmlns:a="http://schemas.openxmlformats.org/drawingml/2006/main" xmlns:p="http://schemas.openxmlformats.org/presentationml/2006/main" xmlns:r="http://schemas.openxmlformats.org/officeDocument/2006/relationships">
-  <p:cSld>
-    <p:spTree>
-      <p:nvGrpSpPr>
-        <p:cNvPr id="1" name=""/>
-        <p:cNvGrpSpPr/>
-        <p:nvPr/>
-      </p:nvGrpSpPr>
-      <p:grpSpPr>
-        <a:xfrm>
-          <a:off x="0" y="0"/>
-          <a:ext cx="0" cy="0"/>
-          <a:chOff x="0" y="0"/>
-          <a:chExt cx="0" cy="0"/>
-        </a:xfrm>
-      </p:grpSpPr>
-      <p:pic>
-        <p:nvPicPr>
-          <p:cNvPr descr="Total Companies" id="9" name="slide9">
-            <a:extLst>
-              <a:ext uri="{FF2B5EF4-FFF2-40B4-BE49-F238E27FC236}">
-                <a16:creationId xmlns:a16="http://schemas.microsoft.com/office/drawing/2014/main" id="{1BA5CFB0-E2A5-41CC-9FD5-23E0F8846693}"/>
-              </a:ext>
-            </a:extLst>
-          </p:cNvPr>
-          <p:cNvPicPr>
-            <a:picLocks noChangeAspect="1"/>
-          </p:cNvPicPr>
-          <p:nvPr/>
-        </p:nvPicPr>
-        <p:blipFill>
-          <a:blip r:embed="rId14">
-            <a:extLst>
-              <a:ext uri="{28A0092B-C50C-407E-A947-70E740481C1C}">
-                <a14:useLocalDpi xmlns:a14="http://schemas.microsoft.com/office/drawing/2010/main" val="0"/>
-              </a:ext>
-            </a:extLst>
-          </a:blip>
-          <a:stretch>
-            <a:fillRect/>
-          </a:stretch>
-        </p:blipFill>
-        <p:spPr>
-          <a:xfrm>
-            <a:off x="5810250" y="1619250"/>
-            <a:ext cx="571500" cy="3619500"/>
+            <a:off x="2118041" y="0"/>
+            <a:ext cx="7955916" cy="6858000"/>
           </a:xfrm>
           <a:prstGeom prst="rect">
             <a:avLst/>

</xml_diff>

<commit_message>
added slides for fbprophet mahcine learning module
</commit_message>
<xml_diff>
--- a/Dashboard/ESG_Analysis.pptx
+++ b/Dashboard/ESG_Analysis.pptx
@@ -12,6 +12,19 @@
     <p:sldId id="260" r:id="rId10"/>
     <p:sldId id="261" r:id="rId11"/>
     <p:sldId id="262" r:id="rId12"/>
+    <p:sldId id="263" r:id="rId13"/>
+    <p:sldId id="264" r:id="rId14"/>
+    <p:sldId id="265" r:id="rId15"/>
+    <p:sldId id="266" r:id="rId16"/>
+    <p:sldId id="267" r:id="rId17"/>
+    <p:sldId id="268" r:id="rId18"/>
+    <p:sldId id="269" r:id="rId19"/>
+    <p:sldId id="270" r:id="rId20"/>
+    <p:sldId id="271" r:id="rId21"/>
+    <p:sldId id="272" r:id="rId22"/>
+    <p:sldId id="273" r:id="rId23"/>
+    <p:sldId id="274" r:id="rId24"/>
+    <p:sldId id="275" r:id="rId25"/>
   </p:sldIdLst>
   <p:sldSz cx="12192000" cy="6858000"/>
   <p:notesSz cx="6858000" cy="9144000"/>
@@ -3332,7 +3345,7 @@
           <p:cNvPr id="0" name="slide1">
             <a:extLst>
               <a:ext uri="{FF2B5EF4-FFF2-40B4-BE49-F238E27FC236}">
-                <a16:creationId xmlns:a16="http://schemas.microsoft.com/office/drawing/2014/main" id="{F5BE6DB0-0ABD-4438-A11B-459AF05617F8}"/>
+                <a16:creationId xmlns:a16="http://schemas.microsoft.com/office/drawing/2014/main" id="{1E01101E-F657-463B-A3BE-96BA9537BE32}"/>
               </a:ext>
             </a:extLst>
           </p:cNvPr>
@@ -3360,7 +3373,7 @@
           <p:cNvPr id="1" name="slide1">
             <a:extLst>
               <a:ext uri="{FF2B5EF4-FFF2-40B4-BE49-F238E27FC236}">
-                <a16:creationId xmlns:a16="http://schemas.microsoft.com/office/drawing/2014/main" id="{2EAE47D9-DD48-4852-9669-710008410DC9}"/>
+                <a16:creationId xmlns:a16="http://schemas.microsoft.com/office/drawing/2014/main" id="{93787692-D440-4C20-B75C-A69F7EFA8DE7}"/>
               </a:ext>
             </a:extLst>
           </p:cNvPr>
@@ -3378,11 +3391,671 @@
           <a:p>
             <a:r>
               <a:rPr/>
-              <a:t>File created on: 2022-04-08 9:15:07 PM</a:t>
-            </a:r>
-          </a:p>
-        </p:txBody>
-      </p:sp>
+              <a:t>File created on: 2022-04-12 11:12:10 AM</a:t>
+            </a:r>
+          </a:p>
+        </p:txBody>
+      </p:sp>
+    </p:spTree>
+    <p:extLst>
+      <p:ext uri="{BB962C8B-B14F-4D97-AF65-F5344CB8AC3E}">
+        <p14:creationId xmlns:p14="http://schemas.microsoft.com/office/powerpoint/2010/main" val="95992585"/>
+      </p:ext>
+    </p:extLst>
+  </p:cSld>
+  <p:clrMapOvr>
+    <a:masterClrMapping/>
+  </p:clrMapOvr>
+</p:sld>
+</file>
+
+<file path=ppt/slides/slide10.xml><?xml version="1.0" encoding="utf-8"?>
+<p:sld xmlns:a="http://schemas.openxmlformats.org/drawingml/2006/main" xmlns:p="http://schemas.openxmlformats.org/presentationml/2006/main" xmlns:r="http://schemas.openxmlformats.org/officeDocument/2006/relationships">
+  <p:cSld>
+    <p:spTree>
+      <p:nvGrpSpPr>
+        <p:cNvPr id="1" name=""/>
+        <p:cNvGrpSpPr/>
+        <p:nvPr/>
+      </p:nvGrpSpPr>
+      <p:grpSpPr>
+        <a:xfrm>
+          <a:off x="0" y="0"/>
+          <a:ext cx="0" cy="0"/>
+          <a:chOff x="0" y="0"/>
+          <a:chExt cx="0" cy="0"/>
+        </a:xfrm>
+      </p:grpSpPr>
+      <p:pic>
+        <p:nvPicPr>
+          <p:cNvPr descr="Max ESG Score (2)" id="10" name="slide10">
+            <a:extLst>
+              <a:ext uri="{FF2B5EF4-FFF2-40B4-BE49-F238E27FC236}">
+                <a16:creationId xmlns:a16="http://schemas.microsoft.com/office/drawing/2014/main" id="{89D3C244-58A9-4F88-9312-B8142CED7344}"/>
+              </a:ext>
+            </a:extLst>
+          </p:cNvPr>
+          <p:cNvPicPr>
+            <a:picLocks noChangeAspect="1"/>
+          </p:cNvPicPr>
+          <p:nvPr/>
+        </p:nvPicPr>
+        <p:blipFill>
+          <a:blip r:embed="rId15">
+            <a:extLst>
+              <a:ext uri="{28A0092B-C50C-407E-A947-70E740481C1C}">
+                <a14:useLocalDpi xmlns:a14="http://schemas.microsoft.com/office/drawing/2010/main" val="0"/>
+              </a:ext>
+            </a:extLst>
+          </a:blip>
+          <a:stretch>
+            <a:fillRect/>
+          </a:stretch>
+        </p:blipFill>
+        <p:spPr>
+          <a:xfrm>
+            <a:off x="5810250" y="1524000"/>
+            <a:ext cx="571500" cy="3810000"/>
+          </a:xfrm>
+          <a:prstGeom prst="rect">
+            <a:avLst/>
+          </a:prstGeom>
+        </p:spPr>
+      </p:pic>
+    </p:spTree>
+    <p:extLst>
+      <p:ext uri="{BB962C8B-B14F-4D97-AF65-F5344CB8AC3E}">
+        <p14:creationId xmlns:p14="http://schemas.microsoft.com/office/powerpoint/2010/main" val="95992585"/>
+      </p:ext>
+    </p:extLst>
+  </p:cSld>
+  <p:clrMapOvr>
+    <a:masterClrMapping/>
+  </p:clrMapOvr>
+</p:sld>
+</file>
+
+<file path=ppt/slides/slide11.xml><?xml version="1.0" encoding="utf-8"?>
+<p:sld xmlns:a="http://schemas.openxmlformats.org/drawingml/2006/main" xmlns:p="http://schemas.openxmlformats.org/presentationml/2006/main" xmlns:r="http://schemas.openxmlformats.org/officeDocument/2006/relationships">
+  <p:cSld>
+    <p:spTree>
+      <p:nvGrpSpPr>
+        <p:cNvPr id="1" name=""/>
+        <p:cNvGrpSpPr/>
+        <p:nvPr/>
+      </p:nvGrpSpPr>
+      <p:grpSpPr>
+        <a:xfrm>
+          <a:off x="0" y="0"/>
+          <a:ext cx="0" cy="0"/>
+          <a:chOff x="0" y="0"/>
+          <a:chExt cx="0" cy="0"/>
+        </a:xfrm>
+      </p:grpSpPr>
+      <p:pic>
+        <p:nvPicPr>
+          <p:cNvPr descr="Max ESG Score" id="11" name="slide11">
+            <a:extLst>
+              <a:ext uri="{FF2B5EF4-FFF2-40B4-BE49-F238E27FC236}">
+                <a16:creationId xmlns:a16="http://schemas.microsoft.com/office/drawing/2014/main" id="{A53AAD71-2B45-41C6-8518-ADE4511ADAE7}"/>
+              </a:ext>
+            </a:extLst>
+          </p:cNvPr>
+          <p:cNvPicPr>
+            <a:picLocks noChangeAspect="1"/>
+          </p:cNvPicPr>
+          <p:nvPr/>
+        </p:nvPicPr>
+        <p:blipFill>
+          <a:blip r:embed="rId16">
+            <a:extLst>
+              <a:ext uri="{28A0092B-C50C-407E-A947-70E740481C1C}">
+                <a14:useLocalDpi xmlns:a14="http://schemas.microsoft.com/office/drawing/2010/main" val="0"/>
+              </a:ext>
+            </a:extLst>
+          </a:blip>
+          <a:stretch>
+            <a:fillRect/>
+          </a:stretch>
+        </p:blipFill>
+        <p:spPr>
+          <a:xfrm>
+            <a:off x="5810250" y="1624012"/>
+            <a:ext cx="571500" cy="3609975"/>
+          </a:xfrm>
+          <a:prstGeom prst="rect">
+            <a:avLst/>
+          </a:prstGeom>
+        </p:spPr>
+      </p:pic>
+    </p:spTree>
+    <p:extLst>
+      <p:ext uri="{BB962C8B-B14F-4D97-AF65-F5344CB8AC3E}">
+        <p14:creationId xmlns:p14="http://schemas.microsoft.com/office/powerpoint/2010/main" val="95992585"/>
+      </p:ext>
+    </p:extLst>
+  </p:cSld>
+  <p:clrMapOvr>
+    <a:masterClrMapping/>
+  </p:clrMapOvr>
+</p:sld>
+</file>
+
+<file path=ppt/slides/slide12.xml><?xml version="1.0" encoding="utf-8"?>
+<p:sld xmlns:a="http://schemas.openxmlformats.org/drawingml/2006/main" xmlns:p="http://schemas.openxmlformats.org/presentationml/2006/main" xmlns:r="http://schemas.openxmlformats.org/officeDocument/2006/relationships">
+  <p:cSld>
+    <p:spTree>
+      <p:nvGrpSpPr>
+        <p:cNvPr id="1" name=""/>
+        <p:cNvGrpSpPr/>
+        <p:nvPr/>
+      </p:nvGrpSpPr>
+      <p:grpSpPr>
+        <a:xfrm>
+          <a:off x="0" y="0"/>
+          <a:ext cx="0" cy="0"/>
+          <a:chOff x="0" y="0"/>
+          <a:chExt cx="0" cy="0"/>
+        </a:xfrm>
+      </p:grpSpPr>
+      <p:pic>
+        <p:nvPicPr>
+          <p:cNvPr descr="ESG correlation analysis" id="12" name="slide12">
+            <a:extLst>
+              <a:ext uri="{FF2B5EF4-FFF2-40B4-BE49-F238E27FC236}">
+                <a16:creationId xmlns:a16="http://schemas.microsoft.com/office/drawing/2014/main" id="{2AE2CF01-7965-4FD2-94DA-04C4C2A04971}"/>
+              </a:ext>
+            </a:extLst>
+          </p:cNvPr>
+          <p:cNvPicPr>
+            <a:picLocks noChangeAspect="1"/>
+          </p:cNvPicPr>
+          <p:nvPr/>
+        </p:nvPicPr>
+        <p:blipFill>
+          <a:blip r:embed="rId17">
+            <a:extLst>
+              <a:ext uri="{28A0092B-C50C-407E-A947-70E740481C1C}">
+                <a14:useLocalDpi xmlns:a14="http://schemas.microsoft.com/office/drawing/2010/main" val="0"/>
+              </a:ext>
+            </a:extLst>
+          </a:blip>
+          <a:stretch>
+            <a:fillRect/>
+          </a:stretch>
+        </p:blipFill>
+        <p:spPr>
+          <a:xfrm>
+            <a:off x="1562100" y="514350"/>
+            <a:ext cx="9067800" cy="5829300"/>
+          </a:xfrm>
+          <a:prstGeom prst="rect">
+            <a:avLst/>
+          </a:prstGeom>
+        </p:spPr>
+      </p:pic>
+    </p:spTree>
+    <p:extLst>
+      <p:ext uri="{BB962C8B-B14F-4D97-AF65-F5344CB8AC3E}">
+        <p14:creationId xmlns:p14="http://schemas.microsoft.com/office/powerpoint/2010/main" val="95992585"/>
+      </p:ext>
+    </p:extLst>
+  </p:cSld>
+  <p:clrMapOvr>
+    <a:masterClrMapping/>
+  </p:clrMapOvr>
+</p:sld>
+</file>
+
+<file path=ppt/slides/slide13.xml><?xml version="1.0" encoding="utf-8"?>
+<p:sld xmlns:a="http://schemas.openxmlformats.org/drawingml/2006/main" xmlns:p="http://schemas.openxmlformats.org/presentationml/2006/main" xmlns:r="http://schemas.openxmlformats.org/officeDocument/2006/relationships">
+  <p:cSld>
+    <p:spTree>
+      <p:nvGrpSpPr>
+        <p:cNvPr id="1" name=""/>
+        <p:cNvGrpSpPr/>
+        <p:nvPr/>
+      </p:nvGrpSpPr>
+      <p:grpSpPr>
+        <a:xfrm>
+          <a:off x="0" y="0"/>
+          <a:ext cx="0" cy="0"/>
+          <a:chOff x="0" y="0"/>
+          <a:chExt cx="0" cy="0"/>
+        </a:xfrm>
+      </p:grpSpPr>
+      <p:pic>
+        <p:nvPicPr>
+          <p:cNvPr descr="Controversies" id="13" name="slide13">
+            <a:extLst>
+              <a:ext uri="{FF2B5EF4-FFF2-40B4-BE49-F238E27FC236}">
+                <a16:creationId xmlns:a16="http://schemas.microsoft.com/office/drawing/2014/main" id="{83A94BB0-317E-4E52-B094-B13BF55F501B}"/>
+              </a:ext>
+            </a:extLst>
+          </p:cNvPr>
+          <p:cNvPicPr>
+            <a:picLocks noChangeAspect="1"/>
+          </p:cNvPicPr>
+          <p:nvPr/>
+        </p:nvPicPr>
+        <p:blipFill>
+          <a:blip r:embed="rId18">
+            <a:extLst>
+              <a:ext uri="{28A0092B-C50C-407E-A947-70E740481C1C}">
+                <a14:useLocalDpi xmlns:a14="http://schemas.microsoft.com/office/drawing/2010/main" val="0"/>
+              </a:ext>
+            </a:extLst>
+          </a:blip>
+          <a:stretch>
+            <a:fillRect/>
+          </a:stretch>
+        </p:blipFill>
+        <p:spPr>
+          <a:xfrm>
+            <a:off x="1809750" y="0"/>
+            <a:ext cx="8572500" cy="6858000"/>
+          </a:xfrm>
+          <a:prstGeom prst="rect">
+            <a:avLst/>
+          </a:prstGeom>
+        </p:spPr>
+      </p:pic>
+    </p:spTree>
+    <p:extLst>
+      <p:ext uri="{BB962C8B-B14F-4D97-AF65-F5344CB8AC3E}">
+        <p14:creationId xmlns:p14="http://schemas.microsoft.com/office/powerpoint/2010/main" val="95992585"/>
+      </p:ext>
+    </p:extLst>
+  </p:cSld>
+  <p:clrMapOvr>
+    <a:masterClrMapping/>
+  </p:clrMapOvr>
+</p:sld>
+</file>
+
+<file path=ppt/slides/slide14.xml><?xml version="1.0" encoding="utf-8"?>
+<p:sld xmlns:a="http://schemas.openxmlformats.org/drawingml/2006/main" xmlns:p="http://schemas.openxmlformats.org/presentationml/2006/main" xmlns:r="http://schemas.openxmlformats.org/officeDocument/2006/relationships">
+  <p:cSld>
+    <p:spTree>
+      <p:nvGrpSpPr>
+        <p:cNvPr id="1" name=""/>
+        <p:cNvGrpSpPr/>
+        <p:nvPr/>
+      </p:nvGrpSpPr>
+      <p:grpSpPr>
+        <a:xfrm>
+          <a:off x="0" y="0"/>
+          <a:ext cx="0" cy="0"/>
+          <a:chOff x="0" y="0"/>
+          <a:chExt cx="0" cy="0"/>
+        </a:xfrm>
+      </p:grpSpPr>
+      <p:pic>
+        <p:nvPicPr>
+          <p:cNvPr descr="ESG Numbers" id="14" name="slide14">
+            <a:extLst>
+              <a:ext uri="{FF2B5EF4-FFF2-40B4-BE49-F238E27FC236}">
+                <a16:creationId xmlns:a16="http://schemas.microsoft.com/office/drawing/2014/main" id="{D011390B-9C19-458B-9E88-FA02D2333313}"/>
+              </a:ext>
+            </a:extLst>
+          </p:cNvPr>
+          <p:cNvPicPr>
+            <a:picLocks noChangeAspect="1"/>
+          </p:cNvPicPr>
+          <p:nvPr/>
+        </p:nvPicPr>
+        <p:blipFill>
+          <a:blip r:embed="rId19">
+            <a:extLst>
+              <a:ext uri="{28A0092B-C50C-407E-A947-70E740481C1C}">
+                <a14:useLocalDpi xmlns:a14="http://schemas.microsoft.com/office/drawing/2010/main" val="0"/>
+              </a:ext>
+            </a:extLst>
+          </a:blip>
+          <a:stretch>
+            <a:fillRect/>
+          </a:stretch>
+        </p:blipFill>
+        <p:spPr>
+          <a:xfrm>
+            <a:off x="1809750" y="0"/>
+            <a:ext cx="8572500" cy="6858000"/>
+          </a:xfrm>
+          <a:prstGeom prst="rect">
+            <a:avLst/>
+          </a:prstGeom>
+        </p:spPr>
+      </p:pic>
+    </p:spTree>
+    <p:extLst>
+      <p:ext uri="{BB962C8B-B14F-4D97-AF65-F5344CB8AC3E}">
+        <p14:creationId xmlns:p14="http://schemas.microsoft.com/office/powerpoint/2010/main" val="95992585"/>
+      </p:ext>
+    </p:extLst>
+  </p:cSld>
+  <p:clrMapOvr>
+    <a:masterClrMapping/>
+  </p:clrMapOvr>
+</p:sld>
+</file>
+
+<file path=ppt/slides/slide15.xml><?xml version="1.0" encoding="utf-8"?>
+<p:sld xmlns:a="http://schemas.openxmlformats.org/drawingml/2006/main" xmlns:p="http://schemas.openxmlformats.org/presentationml/2006/main" xmlns:r="http://schemas.openxmlformats.org/officeDocument/2006/relationships">
+  <p:cSld>
+    <p:spTree>
+      <p:nvGrpSpPr>
+        <p:cNvPr id="1" name=""/>
+        <p:cNvGrpSpPr/>
+        <p:nvPr/>
+      </p:nvGrpSpPr>
+      <p:grpSpPr>
+        <a:xfrm>
+          <a:off x="0" y="0"/>
+          <a:ext cx="0" cy="0"/>
+          <a:chOff x="0" y="0"/>
+          <a:chExt cx="0" cy="0"/>
+        </a:xfrm>
+      </p:grpSpPr>
+      <p:pic>
+        <p:nvPicPr>
+          <p:cNvPr descr="Stock PredictionDash" id="15" name="slide15">
+            <a:extLst>
+              <a:ext uri="{FF2B5EF4-FFF2-40B4-BE49-F238E27FC236}">
+                <a16:creationId xmlns:a16="http://schemas.microsoft.com/office/drawing/2014/main" id="{772DAC47-0649-4109-B06C-922A4697B476}"/>
+              </a:ext>
+            </a:extLst>
+          </p:cNvPr>
+          <p:cNvPicPr>
+            <a:picLocks noChangeAspect="1"/>
+          </p:cNvPicPr>
+          <p:nvPr/>
+        </p:nvPicPr>
+        <p:blipFill>
+          <a:blip r:embed="rId20">
+            <a:extLst>
+              <a:ext uri="{28A0092B-C50C-407E-A947-70E740481C1C}">
+                <a14:useLocalDpi xmlns:a14="http://schemas.microsoft.com/office/drawing/2010/main" val="0"/>
+              </a:ext>
+            </a:extLst>
+          </a:blip>
+          <a:stretch>
+            <a:fillRect/>
+          </a:stretch>
+        </p:blipFill>
+        <p:spPr>
+          <a:xfrm>
+            <a:off x="1809750" y="0"/>
+            <a:ext cx="8572500" cy="6858000"/>
+          </a:xfrm>
+          <a:prstGeom prst="rect">
+            <a:avLst/>
+          </a:prstGeom>
+        </p:spPr>
+      </p:pic>
+    </p:spTree>
+    <p:extLst>
+      <p:ext uri="{BB962C8B-B14F-4D97-AF65-F5344CB8AC3E}">
+        <p14:creationId xmlns:p14="http://schemas.microsoft.com/office/powerpoint/2010/main" val="95992585"/>
+      </p:ext>
+    </p:extLst>
+  </p:cSld>
+  <p:clrMapOvr>
+    <a:masterClrMapping/>
+  </p:clrMapOvr>
+</p:sld>
+</file>
+
+<file path=ppt/slides/slide16.xml><?xml version="1.0" encoding="utf-8"?>
+<p:sld xmlns:a="http://schemas.openxmlformats.org/drawingml/2006/main" xmlns:p="http://schemas.openxmlformats.org/presentationml/2006/main" xmlns:r="http://schemas.openxmlformats.org/officeDocument/2006/relationships">
+  <p:cSld>
+    <p:spTree>
+      <p:nvGrpSpPr>
+        <p:cNvPr id="1" name=""/>
+        <p:cNvGrpSpPr/>
+        <p:nvPr/>
+      </p:nvGrpSpPr>
+      <p:grpSpPr>
+        <a:xfrm>
+          <a:off x="0" y="0"/>
+          <a:ext cx="0" cy="0"/>
+          <a:chOff x="0" y="0"/>
+          <a:chExt cx="0" cy="0"/>
+        </a:xfrm>
+      </p:grpSpPr>
+      <p:pic>
+        <p:nvPicPr>
+          <p:cNvPr descr="ESG Analysis for predicted stocks1" id="16" name="slide16">
+            <a:extLst>
+              <a:ext uri="{FF2B5EF4-FFF2-40B4-BE49-F238E27FC236}">
+                <a16:creationId xmlns:a16="http://schemas.microsoft.com/office/drawing/2014/main" id="{B9F8296B-036D-40F0-A07A-84EA9266C247}"/>
+              </a:ext>
+            </a:extLst>
+          </p:cNvPr>
+          <p:cNvPicPr>
+            <a:picLocks noChangeAspect="1"/>
+          </p:cNvPicPr>
+          <p:nvPr/>
+        </p:nvPicPr>
+        <p:blipFill>
+          <a:blip r:embed="rId21">
+            <a:extLst>
+              <a:ext uri="{28A0092B-C50C-407E-A947-70E740481C1C}">
+                <a14:useLocalDpi xmlns:a14="http://schemas.microsoft.com/office/drawing/2010/main" val="0"/>
+              </a:ext>
+            </a:extLst>
+          </a:blip>
+          <a:stretch>
+            <a:fillRect/>
+          </a:stretch>
+        </p:blipFill>
+        <p:spPr>
+          <a:xfrm>
+            <a:off x="1809750" y="0"/>
+            <a:ext cx="8572500" cy="6858000"/>
+          </a:xfrm>
+          <a:prstGeom prst="rect">
+            <a:avLst/>
+          </a:prstGeom>
+        </p:spPr>
+      </p:pic>
+    </p:spTree>
+    <p:extLst>
+      <p:ext uri="{BB962C8B-B14F-4D97-AF65-F5344CB8AC3E}">
+        <p14:creationId xmlns:p14="http://schemas.microsoft.com/office/powerpoint/2010/main" val="95992585"/>
+      </p:ext>
+    </p:extLst>
+  </p:cSld>
+  <p:clrMapOvr>
+    <a:masterClrMapping/>
+  </p:clrMapOvr>
+</p:sld>
+</file>
+
+<file path=ppt/slides/slide17.xml><?xml version="1.0" encoding="utf-8"?>
+<p:sld xmlns:a="http://schemas.openxmlformats.org/drawingml/2006/main" xmlns:p="http://schemas.openxmlformats.org/presentationml/2006/main" xmlns:r="http://schemas.openxmlformats.org/officeDocument/2006/relationships">
+  <p:cSld>
+    <p:spTree>
+      <p:nvGrpSpPr>
+        <p:cNvPr id="1" name=""/>
+        <p:cNvGrpSpPr/>
+        <p:nvPr/>
+      </p:nvGrpSpPr>
+      <p:grpSpPr>
+        <a:xfrm>
+          <a:off x="0" y="0"/>
+          <a:ext cx="0" cy="0"/>
+          <a:chOff x="0" y="0"/>
+          <a:chExt cx="0" cy="0"/>
+        </a:xfrm>
+      </p:grpSpPr>
+      <p:pic>
+        <p:nvPicPr>
+          <p:cNvPr descr="ESG Analysis for predicted stocks5" id="17" name="slide17">
+            <a:extLst>
+              <a:ext uri="{FF2B5EF4-FFF2-40B4-BE49-F238E27FC236}">
+                <a16:creationId xmlns:a16="http://schemas.microsoft.com/office/drawing/2014/main" id="{7D98772D-895D-4B5C-AAC4-1313C67404D8}"/>
+              </a:ext>
+            </a:extLst>
+          </p:cNvPr>
+          <p:cNvPicPr>
+            <a:picLocks noChangeAspect="1"/>
+          </p:cNvPicPr>
+          <p:nvPr/>
+        </p:nvPicPr>
+        <p:blipFill>
+          <a:blip r:embed="rId22">
+            <a:extLst>
+              <a:ext uri="{28A0092B-C50C-407E-A947-70E740481C1C}">
+                <a14:useLocalDpi xmlns:a14="http://schemas.microsoft.com/office/drawing/2010/main" val="0"/>
+              </a:ext>
+            </a:extLst>
+          </a:blip>
+          <a:stretch>
+            <a:fillRect/>
+          </a:stretch>
+        </p:blipFill>
+        <p:spPr>
+          <a:xfrm>
+            <a:off x="1809750" y="0"/>
+            <a:ext cx="8572500" cy="6858000"/>
+          </a:xfrm>
+          <a:prstGeom prst="rect">
+            <a:avLst/>
+          </a:prstGeom>
+        </p:spPr>
+      </p:pic>
+    </p:spTree>
+    <p:extLst>
+      <p:ext uri="{BB962C8B-B14F-4D97-AF65-F5344CB8AC3E}">
+        <p14:creationId xmlns:p14="http://schemas.microsoft.com/office/powerpoint/2010/main" val="95992585"/>
+      </p:ext>
+    </p:extLst>
+  </p:cSld>
+  <p:clrMapOvr>
+    <a:masterClrMapping/>
+  </p:clrMapOvr>
+</p:sld>
+</file>
+
+<file path=ppt/slides/slide18.xml><?xml version="1.0" encoding="utf-8"?>
+<p:sld xmlns:a="http://schemas.openxmlformats.org/drawingml/2006/main" xmlns:p="http://schemas.openxmlformats.org/presentationml/2006/main" xmlns:r="http://schemas.openxmlformats.org/officeDocument/2006/relationships">
+  <p:cSld>
+    <p:spTree>
+      <p:nvGrpSpPr>
+        <p:cNvPr id="1" name=""/>
+        <p:cNvGrpSpPr/>
+        <p:nvPr/>
+      </p:nvGrpSpPr>
+      <p:grpSpPr>
+        <a:xfrm>
+          <a:off x="0" y="0"/>
+          <a:ext cx="0" cy="0"/>
+          <a:chOff x="0" y="0"/>
+          <a:chExt cx="0" cy="0"/>
+        </a:xfrm>
+      </p:grpSpPr>
+      <p:pic>
+        <p:nvPicPr>
+          <p:cNvPr descr="ESG Analysis for predicted stocks2" id="18" name="slide18">
+            <a:extLst>
+              <a:ext uri="{FF2B5EF4-FFF2-40B4-BE49-F238E27FC236}">
+                <a16:creationId xmlns:a16="http://schemas.microsoft.com/office/drawing/2014/main" id="{90A1E63D-8854-4364-94CA-E7088EE37B49}"/>
+              </a:ext>
+            </a:extLst>
+          </p:cNvPr>
+          <p:cNvPicPr>
+            <a:picLocks noChangeAspect="1"/>
+          </p:cNvPicPr>
+          <p:nvPr/>
+        </p:nvPicPr>
+        <p:blipFill>
+          <a:blip r:embed="rId23">
+            <a:extLst>
+              <a:ext uri="{28A0092B-C50C-407E-A947-70E740481C1C}">
+                <a14:useLocalDpi xmlns:a14="http://schemas.microsoft.com/office/drawing/2010/main" val="0"/>
+              </a:ext>
+            </a:extLst>
+          </a:blip>
+          <a:stretch>
+            <a:fillRect/>
+          </a:stretch>
+        </p:blipFill>
+        <p:spPr>
+          <a:xfrm>
+            <a:off x="1809750" y="0"/>
+            <a:ext cx="8572500" cy="6858000"/>
+          </a:xfrm>
+          <a:prstGeom prst="rect">
+            <a:avLst/>
+          </a:prstGeom>
+        </p:spPr>
+      </p:pic>
+    </p:spTree>
+    <p:extLst>
+      <p:ext uri="{BB962C8B-B14F-4D97-AF65-F5344CB8AC3E}">
+        <p14:creationId xmlns:p14="http://schemas.microsoft.com/office/powerpoint/2010/main" val="95992585"/>
+      </p:ext>
+    </p:extLst>
+  </p:cSld>
+  <p:clrMapOvr>
+    <a:masterClrMapping/>
+  </p:clrMapOvr>
+</p:sld>
+</file>
+
+<file path=ppt/slides/slide19.xml><?xml version="1.0" encoding="utf-8"?>
+<p:sld xmlns:a="http://schemas.openxmlformats.org/drawingml/2006/main" xmlns:p="http://schemas.openxmlformats.org/presentationml/2006/main" xmlns:r="http://schemas.openxmlformats.org/officeDocument/2006/relationships">
+  <p:cSld>
+    <p:spTree>
+      <p:nvGrpSpPr>
+        <p:cNvPr id="1" name=""/>
+        <p:cNvGrpSpPr/>
+        <p:nvPr/>
+      </p:nvGrpSpPr>
+      <p:grpSpPr>
+        <a:xfrm>
+          <a:off x="0" y="0"/>
+          <a:ext cx="0" cy="0"/>
+          <a:chOff x="0" y="0"/>
+          <a:chExt cx="0" cy="0"/>
+        </a:xfrm>
+      </p:grpSpPr>
+      <p:pic>
+        <p:nvPicPr>
+          <p:cNvPr descr="ESG Analysis for predicted stocks7" id="19" name="slide19">
+            <a:extLst>
+              <a:ext uri="{FF2B5EF4-FFF2-40B4-BE49-F238E27FC236}">
+                <a16:creationId xmlns:a16="http://schemas.microsoft.com/office/drawing/2014/main" id="{14EAABEA-7122-4704-AE41-FAC686B3E539}"/>
+              </a:ext>
+            </a:extLst>
+          </p:cNvPr>
+          <p:cNvPicPr>
+            <a:picLocks noChangeAspect="1"/>
+          </p:cNvPicPr>
+          <p:nvPr/>
+        </p:nvPicPr>
+        <p:blipFill>
+          <a:blip r:embed="rId24">
+            <a:extLst>
+              <a:ext uri="{28A0092B-C50C-407E-A947-70E740481C1C}">
+                <a14:useLocalDpi xmlns:a14="http://schemas.microsoft.com/office/drawing/2010/main" val="0"/>
+              </a:ext>
+            </a:extLst>
+          </a:blip>
+          <a:stretch>
+            <a:fillRect/>
+          </a:stretch>
+        </p:blipFill>
+        <p:spPr>
+          <a:xfrm>
+            <a:off x="1809750" y="0"/>
+            <a:ext cx="8572500" cy="6858000"/>
+          </a:xfrm>
+          <a:prstGeom prst="rect">
+            <a:avLst/>
+          </a:prstGeom>
+        </p:spPr>
+      </p:pic>
     </p:spTree>
     <p:extLst>
       <p:ext uri="{BB962C8B-B14F-4D97-AF65-F5344CB8AC3E}">
@@ -3415,10 +4088,10 @@
       </p:grpSpPr>
       <p:pic>
         <p:nvPicPr>
-          <p:cNvPr descr="ESG Analysis for predicted stocks1" id="2" name="slide2">
-            <a:extLst>
-              <a:ext uri="{FF2B5EF4-FFF2-40B4-BE49-F238E27FC236}">
-                <a16:creationId xmlns:a16="http://schemas.microsoft.com/office/drawing/2014/main" id="{F7C8C7EA-F0BF-42F1-9015-3B0DB005BFE9}"/>
+          <p:cNvPr descr="ESG score of featured companies by industry" id="2" name="slide2">
+            <a:extLst>
+              <a:ext uri="{FF2B5EF4-FFF2-40B4-BE49-F238E27FC236}">
+                <a16:creationId xmlns:a16="http://schemas.microsoft.com/office/drawing/2014/main" id="{2340F63A-BF2F-49DC-86D9-5427005099DF}"/>
               </a:ext>
             </a:extLst>
           </p:cNvPr>
@@ -3441,8 +4114,74 @@
         </p:blipFill>
         <p:spPr>
           <a:xfrm>
-            <a:off x="2118041" y="0"/>
-            <a:ext cx="7955916" cy="6858000"/>
+            <a:off x="3901102" y="0"/>
+            <a:ext cx="4389796" cy="6858000"/>
+          </a:xfrm>
+          <a:prstGeom prst="rect">
+            <a:avLst/>
+          </a:prstGeom>
+        </p:spPr>
+      </p:pic>
+    </p:spTree>
+    <p:extLst>
+      <p:ext uri="{BB962C8B-B14F-4D97-AF65-F5344CB8AC3E}">
+        <p14:creationId xmlns:p14="http://schemas.microsoft.com/office/powerpoint/2010/main" val="95992585"/>
+      </p:ext>
+    </p:extLst>
+  </p:cSld>
+  <p:clrMapOvr>
+    <a:masterClrMapping/>
+  </p:clrMapOvr>
+</p:sld>
+</file>
+
+<file path=ppt/slides/slide20.xml><?xml version="1.0" encoding="utf-8"?>
+<p:sld xmlns:a="http://schemas.openxmlformats.org/drawingml/2006/main" xmlns:p="http://schemas.openxmlformats.org/presentationml/2006/main" xmlns:r="http://schemas.openxmlformats.org/officeDocument/2006/relationships">
+  <p:cSld>
+    <p:spTree>
+      <p:nvGrpSpPr>
+        <p:cNvPr id="1" name=""/>
+        <p:cNvGrpSpPr/>
+        <p:nvPr/>
+      </p:nvGrpSpPr>
+      <p:grpSpPr>
+        <a:xfrm>
+          <a:off x="0" y="0"/>
+          <a:ext cx="0" cy="0"/>
+          <a:chOff x="0" y="0"/>
+          <a:chExt cx="0" cy="0"/>
+        </a:xfrm>
+      </p:grpSpPr>
+      <p:pic>
+        <p:nvPicPr>
+          <p:cNvPr descr="ESG Analysis for predicted stocks8" id="20" name="slide20">
+            <a:extLst>
+              <a:ext uri="{FF2B5EF4-FFF2-40B4-BE49-F238E27FC236}">
+                <a16:creationId xmlns:a16="http://schemas.microsoft.com/office/drawing/2014/main" id="{14AA24DA-D15C-4B19-9228-E4A6BD2ED8B7}"/>
+              </a:ext>
+            </a:extLst>
+          </p:cNvPr>
+          <p:cNvPicPr>
+            <a:picLocks noChangeAspect="1"/>
+          </p:cNvPicPr>
+          <p:nvPr/>
+        </p:nvPicPr>
+        <p:blipFill>
+          <a:blip r:embed="rId25">
+            <a:extLst>
+              <a:ext uri="{28A0092B-C50C-407E-A947-70E740481C1C}">
+                <a14:useLocalDpi xmlns:a14="http://schemas.microsoft.com/office/drawing/2010/main" val="0"/>
+              </a:ext>
+            </a:extLst>
+          </a:blip>
+          <a:stretch>
+            <a:fillRect/>
+          </a:stretch>
+        </p:blipFill>
+        <p:spPr>
+          <a:xfrm>
+            <a:off x="1809750" y="0"/>
+            <a:ext cx="8572500" cy="6858000"/>
           </a:xfrm>
           <a:prstGeom prst="rect">
             <a:avLst/>
@@ -3481,10 +4220,10 @@
       </p:grpSpPr>
       <p:pic>
         <p:nvPicPr>
-          <p:cNvPr descr="ESG Analysis for predicted stocks5" id="3" name="slide3">
-            <a:extLst>
-              <a:ext uri="{FF2B5EF4-FFF2-40B4-BE49-F238E27FC236}">
-                <a16:creationId xmlns:a16="http://schemas.microsoft.com/office/drawing/2014/main" id="{F25D74A2-16A4-443A-BA07-756662D31717}"/>
+          <p:cNvPr descr="Breakup of ESG scores based on Industry" id="3" name="slide3">
+            <a:extLst>
+              <a:ext uri="{FF2B5EF4-FFF2-40B4-BE49-F238E27FC236}">
+                <a16:creationId xmlns:a16="http://schemas.microsoft.com/office/drawing/2014/main" id="{471503CB-D39C-4439-82A6-8CB33889BC8F}"/>
               </a:ext>
             </a:extLst>
           </p:cNvPr>
@@ -3507,8 +4246,8 @@
         </p:blipFill>
         <p:spPr>
           <a:xfrm>
-            <a:off x="2118041" y="0"/>
-            <a:ext cx="7955916" cy="6858000"/>
+            <a:off x="1757362" y="500062"/>
+            <a:ext cx="8677275" cy="5857875"/>
           </a:xfrm>
           <a:prstGeom prst="rect">
             <a:avLst/>
@@ -3547,10 +4286,10 @@
       </p:grpSpPr>
       <p:pic>
         <p:nvPicPr>
-          <p:cNvPr descr="ESG Analysis for predicted stocks2" id="4" name="slide4">
-            <a:extLst>
-              <a:ext uri="{FF2B5EF4-FFF2-40B4-BE49-F238E27FC236}">
-                <a16:creationId xmlns:a16="http://schemas.microsoft.com/office/drawing/2014/main" id="{2D49581E-6D1B-4118-B30C-D1393650ECA6}"/>
+          <p:cNvPr descr="All types of controversies across companies" id="4" name="slide4">
+            <a:extLst>
+              <a:ext uri="{FF2B5EF4-FFF2-40B4-BE49-F238E27FC236}">
+                <a16:creationId xmlns:a16="http://schemas.microsoft.com/office/drawing/2014/main" id="{6C00BD38-E921-4E72-B4B5-CE067C7419EE}"/>
               </a:ext>
             </a:extLst>
           </p:cNvPr>
@@ -3573,8 +4312,8 @@
         </p:blipFill>
         <p:spPr>
           <a:xfrm>
-            <a:off x="2118041" y="0"/>
-            <a:ext cx="7955916" cy="6858000"/>
+            <a:off x="2605453" y="0"/>
+            <a:ext cx="6981092" cy="6858000"/>
           </a:xfrm>
           <a:prstGeom prst="rect">
             <a:avLst/>
@@ -3613,10 +4352,10 @@
       </p:grpSpPr>
       <p:pic>
         <p:nvPicPr>
-          <p:cNvPr descr="ESG Analysis for predicted stocks7" id="5" name="slide5">
-            <a:extLst>
-              <a:ext uri="{FF2B5EF4-FFF2-40B4-BE49-F238E27FC236}">
-                <a16:creationId xmlns:a16="http://schemas.microsoft.com/office/drawing/2014/main" id="{CF421625-3A3B-44DA-BE80-A859EEDA6152}"/>
+          <p:cNvPr descr="Controversial business values across companies" id="5" name="slide5">
+            <a:extLst>
+              <a:ext uri="{FF2B5EF4-FFF2-40B4-BE49-F238E27FC236}">
+                <a16:creationId xmlns:a16="http://schemas.microsoft.com/office/drawing/2014/main" id="{EB15C09C-1B8C-419C-8422-DE472886CC89}"/>
               </a:ext>
             </a:extLst>
           </p:cNvPr>
@@ -3639,8 +4378,8 @@
         </p:blipFill>
         <p:spPr>
           <a:xfrm>
-            <a:off x="2118041" y="0"/>
-            <a:ext cx="7955916" cy="6858000"/>
+            <a:off x="3454270" y="0"/>
+            <a:ext cx="5283459" cy="6858000"/>
           </a:xfrm>
           <a:prstGeom prst="rect">
             <a:avLst/>
@@ -3679,10 +4418,10 @@
       </p:grpSpPr>
       <p:pic>
         <p:nvPicPr>
-          <p:cNvPr descr="ESG Analysis for predicted stocks8" id="6" name="slide6">
-            <a:extLst>
-              <a:ext uri="{FF2B5EF4-FFF2-40B4-BE49-F238E27FC236}">
-                <a16:creationId xmlns:a16="http://schemas.microsoft.com/office/drawing/2014/main" id="{67FA76A2-50D2-4781-95D6-76862F142147}"/>
+          <p:cNvPr descr="Stock performance of companies over time" id="6" name="slide6">
+            <a:extLst>
+              <a:ext uri="{FF2B5EF4-FFF2-40B4-BE49-F238E27FC236}">
+                <a16:creationId xmlns:a16="http://schemas.microsoft.com/office/drawing/2014/main" id="{FB89F264-5E12-41FB-B3BE-223393A7D44C}"/>
               </a:ext>
             </a:extLst>
           </p:cNvPr>
@@ -3705,8 +4444,8 @@
         </p:blipFill>
         <p:spPr>
           <a:xfrm>
-            <a:off x="2118041" y="0"/>
-            <a:ext cx="7955916" cy="6858000"/>
+            <a:off x="3943350" y="1785937"/>
+            <a:ext cx="4305300" cy="3286125"/>
           </a:xfrm>
           <a:prstGeom prst="rect">
             <a:avLst/>
@@ -3745,10 +4484,10 @@
       </p:grpSpPr>
       <p:pic>
         <p:nvPicPr>
-          <p:cNvPr descr="ESG Analysis for predicted stocks9" id="7" name="slide7">
-            <a:extLst>
-              <a:ext uri="{FF2B5EF4-FFF2-40B4-BE49-F238E27FC236}">
-                <a16:creationId xmlns:a16="http://schemas.microsoft.com/office/drawing/2014/main" id="{2EC235D1-9117-48FE-9386-0F75D718AAD5}"/>
+          <p:cNvPr descr="Stock Prediction" id="7" name="slide7">
+            <a:extLst>
+              <a:ext uri="{FF2B5EF4-FFF2-40B4-BE49-F238E27FC236}">
+                <a16:creationId xmlns:a16="http://schemas.microsoft.com/office/drawing/2014/main" id="{3662C219-D97C-4456-BFCE-1C637DEF6C9D}"/>
               </a:ext>
             </a:extLst>
           </p:cNvPr>
@@ -3771,8 +4510,140 @@
         </p:blipFill>
         <p:spPr>
           <a:xfrm>
-            <a:off x="2118041" y="0"/>
-            <a:ext cx="7955916" cy="6858000"/>
+            <a:off x="3507750" y="0"/>
+            <a:ext cx="5176498" cy="6858000"/>
+          </a:xfrm>
+          <a:prstGeom prst="rect">
+            <a:avLst/>
+          </a:prstGeom>
+        </p:spPr>
+      </p:pic>
+    </p:spTree>
+    <p:extLst>
+      <p:ext uri="{BB962C8B-B14F-4D97-AF65-F5344CB8AC3E}">
+        <p14:creationId xmlns:p14="http://schemas.microsoft.com/office/powerpoint/2010/main" val="95992585"/>
+      </p:ext>
+    </p:extLst>
+  </p:cSld>
+  <p:clrMapOvr>
+    <a:masterClrMapping/>
+  </p:clrMapOvr>
+</p:sld>
+</file>
+
+<file path=ppt/slides/slide8.xml><?xml version="1.0" encoding="utf-8"?>
+<p:sld xmlns:a="http://schemas.openxmlformats.org/drawingml/2006/main" xmlns:p="http://schemas.openxmlformats.org/presentationml/2006/main" xmlns:r="http://schemas.openxmlformats.org/officeDocument/2006/relationships">
+  <p:cSld>
+    <p:spTree>
+      <p:nvGrpSpPr>
+        <p:cNvPr id="1" name=""/>
+        <p:cNvGrpSpPr/>
+        <p:nvPr/>
+      </p:nvGrpSpPr>
+      <p:grpSpPr>
+        <a:xfrm>
+          <a:off x="0" y="0"/>
+          <a:ext cx="0" cy="0"/>
+          <a:chOff x="0" y="0"/>
+          <a:chExt cx="0" cy="0"/>
+        </a:xfrm>
+      </p:grpSpPr>
+      <p:pic>
+        <p:nvPicPr>
+          <p:cNvPr descr="Average ESG Score" id="8" name="slide8">
+            <a:extLst>
+              <a:ext uri="{FF2B5EF4-FFF2-40B4-BE49-F238E27FC236}">
+                <a16:creationId xmlns:a16="http://schemas.microsoft.com/office/drawing/2014/main" id="{9F46B86E-E188-4089-8F43-B6C12288B5B1}"/>
+              </a:ext>
+            </a:extLst>
+          </p:cNvPr>
+          <p:cNvPicPr>
+            <a:picLocks noChangeAspect="1"/>
+          </p:cNvPicPr>
+          <p:nvPr/>
+        </p:nvPicPr>
+        <p:blipFill>
+          <a:blip r:embed="rId13">
+            <a:extLst>
+              <a:ext uri="{28A0092B-C50C-407E-A947-70E740481C1C}">
+                <a14:useLocalDpi xmlns:a14="http://schemas.microsoft.com/office/drawing/2010/main" val="0"/>
+              </a:ext>
+            </a:extLst>
+          </a:blip>
+          <a:stretch>
+            <a:fillRect/>
+          </a:stretch>
+        </p:blipFill>
+        <p:spPr>
+          <a:xfrm>
+            <a:off x="5810250" y="1519237"/>
+            <a:ext cx="571500" cy="3819525"/>
+          </a:xfrm>
+          <a:prstGeom prst="rect">
+            <a:avLst/>
+          </a:prstGeom>
+        </p:spPr>
+      </p:pic>
+    </p:spTree>
+    <p:extLst>
+      <p:ext uri="{BB962C8B-B14F-4D97-AF65-F5344CB8AC3E}">
+        <p14:creationId xmlns:p14="http://schemas.microsoft.com/office/powerpoint/2010/main" val="95992585"/>
+      </p:ext>
+    </p:extLst>
+  </p:cSld>
+  <p:clrMapOvr>
+    <a:masterClrMapping/>
+  </p:clrMapOvr>
+</p:sld>
+</file>
+
+<file path=ppt/slides/slide9.xml><?xml version="1.0" encoding="utf-8"?>
+<p:sld xmlns:a="http://schemas.openxmlformats.org/drawingml/2006/main" xmlns:p="http://schemas.openxmlformats.org/presentationml/2006/main" xmlns:r="http://schemas.openxmlformats.org/officeDocument/2006/relationships">
+  <p:cSld>
+    <p:spTree>
+      <p:nvGrpSpPr>
+        <p:cNvPr id="1" name=""/>
+        <p:cNvGrpSpPr/>
+        <p:nvPr/>
+      </p:nvGrpSpPr>
+      <p:grpSpPr>
+        <a:xfrm>
+          <a:off x="0" y="0"/>
+          <a:ext cx="0" cy="0"/>
+          <a:chOff x="0" y="0"/>
+          <a:chExt cx="0" cy="0"/>
+        </a:xfrm>
+      </p:grpSpPr>
+      <p:pic>
+        <p:nvPicPr>
+          <p:cNvPr descr="Total Companies" id="9" name="slide9">
+            <a:extLst>
+              <a:ext uri="{FF2B5EF4-FFF2-40B4-BE49-F238E27FC236}">
+                <a16:creationId xmlns:a16="http://schemas.microsoft.com/office/drawing/2014/main" id="{350B1CE0-AECE-4D35-B1E3-46E080A28C37}"/>
+              </a:ext>
+            </a:extLst>
+          </p:cNvPr>
+          <p:cNvPicPr>
+            <a:picLocks noChangeAspect="1"/>
+          </p:cNvPicPr>
+          <p:nvPr/>
+        </p:nvPicPr>
+        <p:blipFill>
+          <a:blip r:embed="rId14">
+            <a:extLst>
+              <a:ext uri="{28A0092B-C50C-407E-A947-70E740481C1C}">
+                <a14:useLocalDpi xmlns:a14="http://schemas.microsoft.com/office/drawing/2010/main" val="0"/>
+              </a:ext>
+            </a:extLst>
+          </a:blip>
+          <a:stretch>
+            <a:fillRect/>
+          </a:stretch>
+        </p:blipFill>
+        <p:spPr>
+          <a:xfrm>
+            <a:off x="5810250" y="1619250"/>
+            <a:ext cx="571500" cy="3619500"/>
           </a:xfrm>
           <a:prstGeom prst="rect">
             <a:avLst/>

</xml_diff>